<commit_message>
added some iteration info to an appendix on the presentation
</commit_message>
<xml_diff>
--- a/Forecasting_presentation.pptx
+++ b/Forecasting_presentation.pptx
@@ -15,6 +15,9 @@
     <p:sldId id="259" r:id="rId9"/>
     <p:sldId id="260" r:id="rId10"/>
     <p:sldId id="263" r:id="rId11"/>
+    <p:sldId id="266" r:id="rId12"/>
+    <p:sldId id="267" r:id="rId13"/>
+    <p:sldId id="268" r:id="rId14"/>
   </p:sldIdLst>
   <p:sldSz cx="12192000" cy="6858000"/>
   <p:notesSz cx="6858000" cy="9144000"/>
@@ -9879,6 +9882,3585 @@
     <p:extLst>
       <p:ext uri="{BB962C8B-B14F-4D97-AF65-F5344CB8AC3E}">
         <p14:creationId xmlns:p14="http://schemas.microsoft.com/office/powerpoint/2010/main" val="2730027785"/>
+      </p:ext>
+    </p:extLst>
+  </p:cSld>
+  <p:clrMapOvr>
+    <a:masterClrMapping/>
+  </p:clrMapOvr>
+</p:sld>
+</file>
+
+<file path=ppt/slides/slide11.xml><?xml version="1.0" encoding="utf-8"?>
+<p:sld xmlns:a="http://schemas.openxmlformats.org/drawingml/2006/main" xmlns:r="http://schemas.openxmlformats.org/officeDocument/2006/relationships" xmlns:p="http://schemas.openxmlformats.org/presentationml/2006/main">
+  <p:cSld>
+    <p:spTree>
+      <p:nvGrpSpPr>
+        <p:cNvPr id="1" name=""/>
+        <p:cNvGrpSpPr/>
+        <p:nvPr/>
+      </p:nvGrpSpPr>
+      <p:grpSpPr>
+        <a:xfrm>
+          <a:off x="0" y="0"/>
+          <a:ext cx="0" cy="0"/>
+          <a:chOff x="0" y="0"/>
+          <a:chExt cx="0" cy="0"/>
+        </a:xfrm>
+      </p:grpSpPr>
+      <p:sp>
+        <p:nvSpPr>
+          <p:cNvPr id="2" name="Title 1">
+            <a:extLst>
+              <a:ext uri="{FF2B5EF4-FFF2-40B4-BE49-F238E27FC236}">
+                <a16:creationId xmlns:a16="http://schemas.microsoft.com/office/drawing/2014/main" id="{4514FD37-5AE1-963B-D96D-3C2F3F517917}"/>
+              </a:ext>
+            </a:extLst>
+          </p:cNvPr>
+          <p:cNvSpPr>
+            <a:spLocks noGrp="1"/>
+          </p:cNvSpPr>
+          <p:nvPr>
+            <p:ph type="ctrTitle"/>
+          </p:nvPr>
+        </p:nvSpPr>
+        <p:spPr/>
+        <p:txBody>
+          <a:bodyPr/>
+          <a:lstStyle/>
+          <a:p>
+            <a:r>
+              <a:rPr lang="en-CA" dirty="0">
+                <a:solidFill>
+                  <a:schemeClr val="bg1"/>
+                </a:solidFill>
+              </a:rPr>
+              <a:t>Appendix/Iterations</a:t>
+            </a:r>
+          </a:p>
+        </p:txBody>
+      </p:sp>
+      <p:sp>
+        <p:nvSpPr>
+          <p:cNvPr id="5" name="Subtitle 4">
+            <a:extLst>
+              <a:ext uri="{FF2B5EF4-FFF2-40B4-BE49-F238E27FC236}">
+                <a16:creationId xmlns:a16="http://schemas.microsoft.com/office/drawing/2014/main" id="{8851B1A1-E615-AE36-9B09-7B3B51B0EB0D}"/>
+              </a:ext>
+            </a:extLst>
+          </p:cNvPr>
+          <p:cNvSpPr>
+            <a:spLocks noGrp="1"/>
+          </p:cNvSpPr>
+          <p:nvPr>
+            <p:ph type="subTitle" idx="1"/>
+          </p:nvPr>
+        </p:nvSpPr>
+        <p:spPr/>
+        <p:txBody>
+          <a:bodyPr/>
+          <a:lstStyle/>
+          <a:p>
+            <a:endParaRPr lang="en-CA"/>
+          </a:p>
+        </p:txBody>
+      </p:sp>
+    </p:spTree>
+    <p:extLst>
+      <p:ext uri="{BB962C8B-B14F-4D97-AF65-F5344CB8AC3E}">
+        <p14:creationId xmlns:p14="http://schemas.microsoft.com/office/powerpoint/2010/main" val="2522263508"/>
+      </p:ext>
+    </p:extLst>
+  </p:cSld>
+  <p:clrMapOvr>
+    <a:masterClrMapping/>
+  </p:clrMapOvr>
+</p:sld>
+</file>
+
+<file path=ppt/slides/slide12.xml><?xml version="1.0" encoding="utf-8"?>
+<p:sld xmlns:a="http://schemas.openxmlformats.org/drawingml/2006/main" xmlns:r="http://schemas.openxmlformats.org/officeDocument/2006/relationships" xmlns:p="http://schemas.openxmlformats.org/presentationml/2006/main">
+  <p:cSld>
+    <p:spTree>
+      <p:nvGrpSpPr>
+        <p:cNvPr id="1" name=""/>
+        <p:cNvGrpSpPr/>
+        <p:nvPr/>
+      </p:nvGrpSpPr>
+      <p:grpSpPr>
+        <a:xfrm>
+          <a:off x="0" y="0"/>
+          <a:ext cx="0" cy="0"/>
+          <a:chOff x="0" y="0"/>
+          <a:chExt cx="0" cy="0"/>
+        </a:xfrm>
+      </p:grpSpPr>
+      <p:sp>
+        <p:nvSpPr>
+          <p:cNvPr id="2" name="Title 1">
+            <a:extLst>
+              <a:ext uri="{FF2B5EF4-FFF2-40B4-BE49-F238E27FC236}">
+                <a16:creationId xmlns:a16="http://schemas.microsoft.com/office/drawing/2014/main" id="{BF945539-0D31-B493-97C1-19BC9CBC0DE2}"/>
+              </a:ext>
+            </a:extLst>
+          </p:cNvPr>
+          <p:cNvSpPr>
+            <a:spLocks noGrp="1"/>
+          </p:cNvSpPr>
+          <p:nvPr>
+            <p:ph type="title"/>
+          </p:nvPr>
+        </p:nvSpPr>
+        <p:spPr>
+          <a:xfrm>
+            <a:off x="152400" y="352373"/>
+            <a:ext cx="10515600" cy="1325563"/>
+          </a:xfrm>
+        </p:spPr>
+        <p:txBody>
+          <a:bodyPr/>
+          <a:lstStyle/>
+          <a:p>
+            <a:r>
+              <a:rPr lang="en-CA" b="1" dirty="0">
+                <a:solidFill>
+                  <a:schemeClr val="bg1"/>
+                </a:solidFill>
+              </a:rPr>
+              <a:t>LSTM #1 - iterations</a:t>
+            </a:r>
+          </a:p>
+        </p:txBody>
+      </p:sp>
+      <p:sp>
+        <p:nvSpPr>
+          <p:cNvPr id="3" name="Content Placeholder 2">
+            <a:extLst>
+              <a:ext uri="{FF2B5EF4-FFF2-40B4-BE49-F238E27FC236}">
+                <a16:creationId xmlns:a16="http://schemas.microsoft.com/office/drawing/2014/main" id="{CAAF41D1-A51E-FC32-C54D-8B97E4F7621D}"/>
+              </a:ext>
+            </a:extLst>
+          </p:cNvPr>
+          <p:cNvSpPr>
+            <a:spLocks noGrp="1"/>
+          </p:cNvSpPr>
+          <p:nvPr>
+            <p:ph sz="half" idx="1"/>
+          </p:nvPr>
+        </p:nvSpPr>
+        <p:spPr>
+          <a:xfrm>
+            <a:off x="336006" y="1803400"/>
+            <a:ext cx="5181600" cy="4330313"/>
+          </a:xfrm>
+        </p:spPr>
+        <p:txBody>
+          <a:bodyPr>
+            <a:normAutofit/>
+          </a:bodyPr>
+          <a:lstStyle/>
+          <a:p>
+            <a:pPr marL="0" indent="0">
+              <a:buNone/>
+            </a:pPr>
+            <a:r>
+              <a:rPr lang="en-CA" dirty="0">
+                <a:solidFill>
+                  <a:schemeClr val="bg1"/>
+                </a:solidFill>
+              </a:rPr>
+              <a:t>Multiple iterations were run on the LSTM model – many of those iterations are listed in the chart pictured</a:t>
+            </a:r>
+          </a:p>
+          <a:p>
+            <a:pPr marL="0" indent="0">
+              <a:buNone/>
+            </a:pPr>
+            <a:r>
+              <a:rPr lang="en-CA" sz="2400" dirty="0">
+                <a:solidFill>
+                  <a:schemeClr val="bg1"/>
+                </a:solidFill>
+              </a:rPr>
+              <a:t>While the best test RSME fell with 4-weeks of prediction, I chose to move forward with utilizing the 16-weeks of data and 1 layer.  The RSME test rate wasn’t that much worse than the optimal, but provided an additional 12 weeks of prediction</a:t>
+            </a:r>
+          </a:p>
+          <a:p>
+            <a:endParaRPr lang="en-CA" sz="2400" dirty="0">
+              <a:solidFill>
+                <a:schemeClr val="bg1"/>
+              </a:solidFill>
+            </a:endParaRPr>
+          </a:p>
+        </p:txBody>
+      </p:sp>
+      <p:graphicFrame>
+        <p:nvGraphicFramePr>
+          <p:cNvPr id="6" name="Table 5">
+            <a:extLst>
+              <a:ext uri="{FF2B5EF4-FFF2-40B4-BE49-F238E27FC236}">
+                <a16:creationId xmlns:a16="http://schemas.microsoft.com/office/drawing/2014/main" id="{C8D0AF4E-090A-F3D1-1BBB-DFC052BD10F6}"/>
+              </a:ext>
+            </a:extLst>
+          </p:cNvPr>
+          <p:cNvGraphicFramePr>
+            <a:graphicFrameLocks noGrp="1"/>
+          </p:cNvGraphicFramePr>
+          <p:nvPr>
+            <p:extLst>
+              <p:ext uri="{D42A27DB-BD31-4B8C-83A1-F6EECF244321}">
+                <p14:modId xmlns:p14="http://schemas.microsoft.com/office/powerpoint/2010/main" val="131238162"/>
+              </p:ext>
+            </p:extLst>
+          </p:nvPr>
+        </p:nvGraphicFramePr>
+        <p:xfrm>
+          <a:off x="6220883" y="2039771"/>
+          <a:ext cx="4356100" cy="1645920"/>
+        </p:xfrm>
+        <a:graphic>
+          <a:graphicData uri="http://schemas.openxmlformats.org/drawingml/2006/table">
+            <a:tbl>
+              <a:tblPr/>
+              <a:tblGrid>
+                <a:gridCol w="1206500">
+                  <a:extLst>
+                    <a:ext uri="{9D8B030D-6E8A-4147-A177-3AD203B41FA5}">
+                      <a16:colId xmlns:a16="http://schemas.microsoft.com/office/drawing/2014/main" val="972063070"/>
+                    </a:ext>
+                  </a:extLst>
+                </a:gridCol>
+                <a:gridCol w="863600">
+                  <a:extLst>
+                    <a:ext uri="{9D8B030D-6E8A-4147-A177-3AD203B41FA5}">
+                      <a16:colId xmlns:a16="http://schemas.microsoft.com/office/drawing/2014/main" val="2834702786"/>
+                    </a:ext>
+                  </a:extLst>
+                </a:gridCol>
+                <a:gridCol w="863600">
+                  <a:extLst>
+                    <a:ext uri="{9D8B030D-6E8A-4147-A177-3AD203B41FA5}">
+                      <a16:colId xmlns:a16="http://schemas.microsoft.com/office/drawing/2014/main" val="3694832822"/>
+                    </a:ext>
+                  </a:extLst>
+                </a:gridCol>
+                <a:gridCol w="1422400">
+                  <a:extLst>
+                    <a:ext uri="{9D8B030D-6E8A-4147-A177-3AD203B41FA5}">
+                      <a16:colId xmlns:a16="http://schemas.microsoft.com/office/drawing/2014/main" val="138734252"/>
+                    </a:ext>
+                  </a:extLst>
+                </a:gridCol>
+              </a:tblGrid>
+              <a:tr h="182880">
+                <a:tc>
+                  <a:txBody>
+                    <a:bodyPr/>
+                    <a:lstStyle/>
+                    <a:p>
+                      <a:pPr algn="ctr" fontAlgn="b"/>
+                      <a:r>
+                        <a:rPr lang="en-CA" sz="1100" b="1" i="0" u="none" strike="noStrike">
+                          <a:solidFill>
+                            <a:srgbClr val="000000"/>
+                          </a:solidFill>
+                          <a:effectLst/>
+                          <a:latin typeface="Aptos Narrow" panose="020B0004020202020204" pitchFamily="34" charset="0"/>
+                        </a:rPr>
+                        <a:t>Weeks of prediction</a:t>
+                      </a:r>
+                    </a:p>
+                  </a:txBody>
+                  <a:tcPr marL="7620" marR="7620" marT="7620" marB="0" anchor="b">
+                    <a:lnL w="6350" cap="flat" cmpd="sng" algn="ctr">
+                      <a:solidFill>
+                        <a:srgbClr val="000000"/>
+                      </a:solidFill>
+                      <a:prstDash val="solid"/>
+                      <a:round/>
+                      <a:headEnd type="none" w="med" len="med"/>
+                      <a:tailEnd type="none" w="med" len="med"/>
+                    </a:lnL>
+                    <a:lnR w="6350" cap="flat" cmpd="sng" algn="ctr">
+                      <a:solidFill>
+                        <a:srgbClr val="000000"/>
+                      </a:solidFill>
+                      <a:prstDash val="solid"/>
+                      <a:round/>
+                      <a:headEnd type="none" w="med" len="med"/>
+                      <a:tailEnd type="none" w="med" len="med"/>
+                    </a:lnR>
+                    <a:lnT w="6350" cap="flat" cmpd="sng" algn="ctr">
+                      <a:solidFill>
+                        <a:srgbClr val="000000"/>
+                      </a:solidFill>
+                      <a:prstDash val="solid"/>
+                      <a:round/>
+                      <a:headEnd type="none" w="med" len="med"/>
+                      <a:tailEnd type="none" w="med" len="med"/>
+                    </a:lnT>
+                    <a:lnB w="6350" cap="flat" cmpd="sng" algn="ctr">
+                      <a:solidFill>
+                        <a:srgbClr val="000000"/>
+                      </a:solidFill>
+                      <a:prstDash val="solid"/>
+                      <a:round/>
+                      <a:headEnd type="none" w="med" len="med"/>
+                      <a:tailEnd type="none" w="med" len="med"/>
+                    </a:lnB>
+                    <a:solidFill>
+                      <a:schemeClr val="bg1"/>
+                    </a:solidFill>
+                  </a:tcPr>
+                </a:tc>
+                <a:tc>
+                  <a:txBody>
+                    <a:bodyPr/>
+                    <a:lstStyle/>
+                    <a:p>
+                      <a:pPr algn="ctr" fontAlgn="b"/>
+                      <a:r>
+                        <a:rPr lang="en-CA" sz="1100" b="1" i="0" u="none" strike="noStrike">
+                          <a:solidFill>
+                            <a:srgbClr val="000000"/>
+                          </a:solidFill>
+                          <a:effectLst/>
+                          <a:latin typeface="Aptos Narrow" panose="020B0004020202020204" pitchFamily="34" charset="0"/>
+                        </a:rPr>
+                        <a:t>Layers</a:t>
+                      </a:r>
+                    </a:p>
+                  </a:txBody>
+                  <a:tcPr marL="7620" marR="7620" marT="7620" marB="0" anchor="b">
+                    <a:lnL w="6350" cap="flat" cmpd="sng" algn="ctr">
+                      <a:solidFill>
+                        <a:srgbClr val="000000"/>
+                      </a:solidFill>
+                      <a:prstDash val="solid"/>
+                      <a:round/>
+                      <a:headEnd type="none" w="med" len="med"/>
+                      <a:tailEnd type="none" w="med" len="med"/>
+                    </a:lnL>
+                    <a:lnR w="6350" cap="flat" cmpd="sng" algn="ctr">
+                      <a:solidFill>
+                        <a:srgbClr val="000000"/>
+                      </a:solidFill>
+                      <a:prstDash val="solid"/>
+                      <a:round/>
+                      <a:headEnd type="none" w="med" len="med"/>
+                      <a:tailEnd type="none" w="med" len="med"/>
+                    </a:lnR>
+                    <a:lnT w="6350" cap="flat" cmpd="sng" algn="ctr">
+                      <a:solidFill>
+                        <a:srgbClr val="000000"/>
+                      </a:solidFill>
+                      <a:prstDash val="solid"/>
+                      <a:round/>
+                      <a:headEnd type="none" w="med" len="med"/>
+                      <a:tailEnd type="none" w="med" len="med"/>
+                    </a:lnT>
+                    <a:lnB w="6350" cap="flat" cmpd="sng" algn="ctr">
+                      <a:solidFill>
+                        <a:srgbClr val="000000"/>
+                      </a:solidFill>
+                      <a:prstDash val="solid"/>
+                      <a:round/>
+                      <a:headEnd type="none" w="med" len="med"/>
+                      <a:tailEnd type="none" w="med" len="med"/>
+                    </a:lnB>
+                    <a:solidFill>
+                      <a:schemeClr val="bg1"/>
+                    </a:solidFill>
+                  </a:tcPr>
+                </a:tc>
+                <a:tc>
+                  <a:txBody>
+                    <a:bodyPr/>
+                    <a:lstStyle/>
+                    <a:p>
+                      <a:pPr algn="ctr" fontAlgn="b"/>
+                      <a:r>
+                        <a:rPr lang="en-CA" sz="1100" b="1" i="0" u="none" strike="noStrike">
+                          <a:solidFill>
+                            <a:srgbClr val="000000"/>
+                          </a:solidFill>
+                          <a:effectLst/>
+                          <a:latin typeface="Aptos Narrow" panose="020B0004020202020204" pitchFamily="34" charset="0"/>
+                        </a:rPr>
+                        <a:t>Train RSME</a:t>
+                      </a:r>
+                    </a:p>
+                  </a:txBody>
+                  <a:tcPr marL="7620" marR="7620" marT="7620" marB="0" anchor="b">
+                    <a:lnL w="6350" cap="flat" cmpd="sng" algn="ctr">
+                      <a:solidFill>
+                        <a:srgbClr val="000000"/>
+                      </a:solidFill>
+                      <a:prstDash val="solid"/>
+                      <a:round/>
+                      <a:headEnd type="none" w="med" len="med"/>
+                      <a:tailEnd type="none" w="med" len="med"/>
+                    </a:lnL>
+                    <a:lnR w="6350" cap="flat" cmpd="sng" algn="ctr">
+                      <a:solidFill>
+                        <a:srgbClr val="000000"/>
+                      </a:solidFill>
+                      <a:prstDash val="solid"/>
+                      <a:round/>
+                      <a:headEnd type="none" w="med" len="med"/>
+                      <a:tailEnd type="none" w="med" len="med"/>
+                    </a:lnR>
+                    <a:lnT w="6350" cap="flat" cmpd="sng" algn="ctr">
+                      <a:solidFill>
+                        <a:srgbClr val="000000"/>
+                      </a:solidFill>
+                      <a:prstDash val="solid"/>
+                      <a:round/>
+                      <a:headEnd type="none" w="med" len="med"/>
+                      <a:tailEnd type="none" w="med" len="med"/>
+                    </a:lnT>
+                    <a:lnB w="6350" cap="flat" cmpd="sng" algn="ctr">
+                      <a:solidFill>
+                        <a:srgbClr val="000000"/>
+                      </a:solidFill>
+                      <a:prstDash val="solid"/>
+                      <a:round/>
+                      <a:headEnd type="none" w="med" len="med"/>
+                      <a:tailEnd type="none" w="med" len="med"/>
+                    </a:lnB>
+                    <a:solidFill>
+                      <a:schemeClr val="bg1"/>
+                    </a:solidFill>
+                  </a:tcPr>
+                </a:tc>
+                <a:tc>
+                  <a:txBody>
+                    <a:bodyPr/>
+                    <a:lstStyle/>
+                    <a:p>
+                      <a:pPr algn="ctr" fontAlgn="b"/>
+                      <a:r>
+                        <a:rPr lang="en-CA" sz="1100" b="1" i="0" u="none" strike="noStrike">
+                          <a:solidFill>
+                            <a:srgbClr val="000000"/>
+                          </a:solidFill>
+                          <a:effectLst/>
+                          <a:latin typeface="Aptos Narrow" panose="020B0004020202020204" pitchFamily="34" charset="0"/>
+                        </a:rPr>
+                        <a:t>Test RSME</a:t>
+                      </a:r>
+                    </a:p>
+                  </a:txBody>
+                  <a:tcPr marL="7620" marR="7620" marT="7620" marB="0" anchor="b">
+                    <a:lnL w="6350" cap="flat" cmpd="sng" algn="ctr">
+                      <a:solidFill>
+                        <a:srgbClr val="000000"/>
+                      </a:solidFill>
+                      <a:prstDash val="solid"/>
+                      <a:round/>
+                      <a:headEnd type="none" w="med" len="med"/>
+                      <a:tailEnd type="none" w="med" len="med"/>
+                    </a:lnL>
+                    <a:lnR w="6350" cap="flat" cmpd="sng" algn="ctr">
+                      <a:solidFill>
+                        <a:srgbClr val="000000"/>
+                      </a:solidFill>
+                      <a:prstDash val="solid"/>
+                      <a:round/>
+                      <a:headEnd type="none" w="med" len="med"/>
+                      <a:tailEnd type="none" w="med" len="med"/>
+                    </a:lnR>
+                    <a:lnT w="6350" cap="flat" cmpd="sng" algn="ctr">
+                      <a:solidFill>
+                        <a:srgbClr val="000000"/>
+                      </a:solidFill>
+                      <a:prstDash val="solid"/>
+                      <a:round/>
+                      <a:headEnd type="none" w="med" len="med"/>
+                      <a:tailEnd type="none" w="med" len="med"/>
+                    </a:lnT>
+                    <a:lnB w="6350" cap="flat" cmpd="sng" algn="ctr">
+                      <a:solidFill>
+                        <a:srgbClr val="000000"/>
+                      </a:solidFill>
+                      <a:prstDash val="solid"/>
+                      <a:round/>
+                      <a:headEnd type="none" w="med" len="med"/>
+                      <a:tailEnd type="none" w="med" len="med"/>
+                    </a:lnB>
+                    <a:solidFill>
+                      <a:schemeClr val="bg1"/>
+                    </a:solidFill>
+                  </a:tcPr>
+                </a:tc>
+                <a:extLst>
+                  <a:ext uri="{0D108BD9-81ED-4DB2-BD59-A6C34878D82A}">
+                    <a16:rowId xmlns:a16="http://schemas.microsoft.com/office/drawing/2014/main" val="3199402558"/>
+                  </a:ext>
+                </a:extLst>
+              </a:tr>
+              <a:tr h="182880">
+                <a:tc>
+                  <a:txBody>
+                    <a:bodyPr/>
+                    <a:lstStyle/>
+                    <a:p>
+                      <a:pPr algn="r" fontAlgn="b"/>
+                      <a:r>
+                        <a:rPr lang="en-CA" sz="1100" b="0" i="0" u="none" strike="noStrike">
+                          <a:solidFill>
+                            <a:srgbClr val="000000"/>
+                          </a:solidFill>
+                          <a:effectLst/>
+                          <a:latin typeface="Aptos Narrow" panose="020B0004020202020204" pitchFamily="34" charset="0"/>
+                        </a:rPr>
+                        <a:t>4</a:t>
+                      </a:r>
+                    </a:p>
+                  </a:txBody>
+                  <a:tcPr marL="7620" marR="7620" marT="7620" marB="0" anchor="b">
+                    <a:lnL w="6350" cap="flat" cmpd="sng" algn="ctr">
+                      <a:solidFill>
+                        <a:srgbClr val="000000"/>
+                      </a:solidFill>
+                      <a:prstDash val="solid"/>
+                      <a:round/>
+                      <a:headEnd type="none" w="med" len="med"/>
+                      <a:tailEnd type="none" w="med" len="med"/>
+                    </a:lnL>
+                    <a:lnR w="6350" cap="flat" cmpd="sng" algn="ctr">
+                      <a:solidFill>
+                        <a:srgbClr val="000000"/>
+                      </a:solidFill>
+                      <a:prstDash val="solid"/>
+                      <a:round/>
+                      <a:headEnd type="none" w="med" len="med"/>
+                      <a:tailEnd type="none" w="med" len="med"/>
+                    </a:lnR>
+                    <a:lnT w="6350" cap="flat" cmpd="sng" algn="ctr">
+                      <a:solidFill>
+                        <a:srgbClr val="000000"/>
+                      </a:solidFill>
+                      <a:prstDash val="solid"/>
+                      <a:round/>
+                      <a:headEnd type="none" w="med" len="med"/>
+                      <a:tailEnd type="none" w="med" len="med"/>
+                    </a:lnT>
+                    <a:lnB w="6350" cap="flat" cmpd="sng" algn="ctr">
+                      <a:solidFill>
+                        <a:srgbClr val="000000"/>
+                      </a:solidFill>
+                      <a:prstDash val="solid"/>
+                      <a:round/>
+                      <a:headEnd type="none" w="med" len="med"/>
+                      <a:tailEnd type="none" w="med" len="med"/>
+                    </a:lnB>
+                    <a:solidFill>
+                      <a:schemeClr val="bg1"/>
+                    </a:solidFill>
+                  </a:tcPr>
+                </a:tc>
+                <a:tc>
+                  <a:txBody>
+                    <a:bodyPr/>
+                    <a:lstStyle/>
+                    <a:p>
+                      <a:pPr algn="r" fontAlgn="b"/>
+                      <a:r>
+                        <a:rPr lang="en-CA" sz="1100" b="0" i="0" u="none" strike="noStrike">
+                          <a:solidFill>
+                            <a:srgbClr val="000000"/>
+                          </a:solidFill>
+                          <a:effectLst/>
+                          <a:latin typeface="Aptos Narrow" panose="020B0004020202020204" pitchFamily="34" charset="0"/>
+                        </a:rPr>
+                        <a:t>1</a:t>
+                      </a:r>
+                    </a:p>
+                  </a:txBody>
+                  <a:tcPr marL="7620" marR="7620" marT="7620" marB="0" anchor="b">
+                    <a:lnL w="6350" cap="flat" cmpd="sng" algn="ctr">
+                      <a:solidFill>
+                        <a:srgbClr val="000000"/>
+                      </a:solidFill>
+                      <a:prstDash val="solid"/>
+                      <a:round/>
+                      <a:headEnd type="none" w="med" len="med"/>
+                      <a:tailEnd type="none" w="med" len="med"/>
+                    </a:lnL>
+                    <a:lnR w="6350" cap="flat" cmpd="sng" algn="ctr">
+                      <a:solidFill>
+                        <a:srgbClr val="000000"/>
+                      </a:solidFill>
+                      <a:prstDash val="solid"/>
+                      <a:round/>
+                      <a:headEnd type="none" w="med" len="med"/>
+                      <a:tailEnd type="none" w="med" len="med"/>
+                    </a:lnR>
+                    <a:lnT w="6350" cap="flat" cmpd="sng" algn="ctr">
+                      <a:solidFill>
+                        <a:srgbClr val="000000"/>
+                      </a:solidFill>
+                      <a:prstDash val="solid"/>
+                      <a:round/>
+                      <a:headEnd type="none" w="med" len="med"/>
+                      <a:tailEnd type="none" w="med" len="med"/>
+                    </a:lnT>
+                    <a:lnB w="6350" cap="flat" cmpd="sng" algn="ctr">
+                      <a:solidFill>
+                        <a:srgbClr val="000000"/>
+                      </a:solidFill>
+                      <a:prstDash val="solid"/>
+                      <a:round/>
+                      <a:headEnd type="none" w="med" len="med"/>
+                      <a:tailEnd type="none" w="med" len="med"/>
+                    </a:lnB>
+                    <a:solidFill>
+                      <a:schemeClr val="bg1"/>
+                    </a:solidFill>
+                  </a:tcPr>
+                </a:tc>
+                <a:tc>
+                  <a:txBody>
+                    <a:bodyPr/>
+                    <a:lstStyle/>
+                    <a:p>
+                      <a:pPr algn="r" fontAlgn="b"/>
+                      <a:r>
+                        <a:rPr lang="en-CA" sz="1100" b="0" i="0" u="none" strike="noStrike">
+                          <a:solidFill>
+                            <a:srgbClr val="000000"/>
+                          </a:solidFill>
+                          <a:effectLst/>
+                          <a:latin typeface="Aptos Narrow" panose="020B0004020202020204" pitchFamily="34" charset="0"/>
+                        </a:rPr>
+                        <a:t>349</a:t>
+                      </a:r>
+                    </a:p>
+                  </a:txBody>
+                  <a:tcPr marL="7620" marR="7620" marT="7620" marB="0" anchor="b">
+                    <a:lnL w="6350" cap="flat" cmpd="sng" algn="ctr">
+                      <a:solidFill>
+                        <a:srgbClr val="000000"/>
+                      </a:solidFill>
+                      <a:prstDash val="solid"/>
+                      <a:round/>
+                      <a:headEnd type="none" w="med" len="med"/>
+                      <a:tailEnd type="none" w="med" len="med"/>
+                    </a:lnL>
+                    <a:lnR w="6350" cap="flat" cmpd="sng" algn="ctr">
+                      <a:solidFill>
+                        <a:srgbClr val="000000"/>
+                      </a:solidFill>
+                      <a:prstDash val="solid"/>
+                      <a:round/>
+                      <a:headEnd type="none" w="med" len="med"/>
+                      <a:tailEnd type="none" w="med" len="med"/>
+                    </a:lnR>
+                    <a:lnT w="6350" cap="flat" cmpd="sng" algn="ctr">
+                      <a:solidFill>
+                        <a:srgbClr val="000000"/>
+                      </a:solidFill>
+                      <a:prstDash val="solid"/>
+                      <a:round/>
+                      <a:headEnd type="none" w="med" len="med"/>
+                      <a:tailEnd type="none" w="med" len="med"/>
+                    </a:lnT>
+                    <a:lnB w="6350" cap="flat" cmpd="sng" algn="ctr">
+                      <a:solidFill>
+                        <a:srgbClr val="000000"/>
+                      </a:solidFill>
+                      <a:prstDash val="solid"/>
+                      <a:round/>
+                      <a:headEnd type="none" w="med" len="med"/>
+                      <a:tailEnd type="none" w="med" len="med"/>
+                    </a:lnB>
+                    <a:solidFill>
+                      <a:schemeClr val="bg1"/>
+                    </a:solidFill>
+                  </a:tcPr>
+                </a:tc>
+                <a:tc>
+                  <a:txBody>
+                    <a:bodyPr/>
+                    <a:lstStyle/>
+                    <a:p>
+                      <a:pPr algn="r" fontAlgn="b"/>
+                      <a:r>
+                        <a:rPr lang="en-CA" sz="1100" b="0" i="0" u="none" strike="noStrike">
+                          <a:solidFill>
+                            <a:srgbClr val="000000"/>
+                          </a:solidFill>
+                          <a:effectLst/>
+                          <a:latin typeface="Aptos Narrow" panose="020B0004020202020204" pitchFamily="34" charset="0"/>
+                        </a:rPr>
+                        <a:t>599</a:t>
+                      </a:r>
+                    </a:p>
+                  </a:txBody>
+                  <a:tcPr marL="7620" marR="7620" marT="7620" marB="0" anchor="b">
+                    <a:lnL w="6350" cap="flat" cmpd="sng" algn="ctr">
+                      <a:solidFill>
+                        <a:srgbClr val="000000"/>
+                      </a:solidFill>
+                      <a:prstDash val="solid"/>
+                      <a:round/>
+                      <a:headEnd type="none" w="med" len="med"/>
+                      <a:tailEnd type="none" w="med" len="med"/>
+                    </a:lnL>
+                    <a:lnR w="6350" cap="flat" cmpd="sng" algn="ctr">
+                      <a:solidFill>
+                        <a:srgbClr val="000000"/>
+                      </a:solidFill>
+                      <a:prstDash val="solid"/>
+                      <a:round/>
+                      <a:headEnd type="none" w="med" len="med"/>
+                      <a:tailEnd type="none" w="med" len="med"/>
+                    </a:lnR>
+                    <a:lnT w="6350" cap="flat" cmpd="sng" algn="ctr">
+                      <a:solidFill>
+                        <a:srgbClr val="000000"/>
+                      </a:solidFill>
+                      <a:prstDash val="solid"/>
+                      <a:round/>
+                      <a:headEnd type="none" w="med" len="med"/>
+                      <a:tailEnd type="none" w="med" len="med"/>
+                    </a:lnT>
+                    <a:lnB w="6350" cap="flat" cmpd="sng" algn="ctr">
+                      <a:solidFill>
+                        <a:srgbClr val="000000"/>
+                      </a:solidFill>
+                      <a:prstDash val="solid"/>
+                      <a:round/>
+                      <a:headEnd type="none" w="med" len="med"/>
+                      <a:tailEnd type="none" w="med" len="med"/>
+                    </a:lnB>
+                    <a:solidFill>
+                      <a:schemeClr val="bg1"/>
+                    </a:solidFill>
+                  </a:tcPr>
+                </a:tc>
+                <a:extLst>
+                  <a:ext uri="{0D108BD9-81ED-4DB2-BD59-A6C34878D82A}">
+                    <a16:rowId xmlns:a16="http://schemas.microsoft.com/office/drawing/2014/main" val="2417356638"/>
+                  </a:ext>
+                </a:extLst>
+              </a:tr>
+              <a:tr h="182880">
+                <a:tc>
+                  <a:txBody>
+                    <a:bodyPr/>
+                    <a:lstStyle/>
+                    <a:p>
+                      <a:pPr algn="r" fontAlgn="b"/>
+                      <a:r>
+                        <a:rPr lang="en-CA" sz="1100" b="0" i="0" u="none" strike="noStrike">
+                          <a:solidFill>
+                            <a:srgbClr val="000000"/>
+                          </a:solidFill>
+                          <a:effectLst/>
+                          <a:latin typeface="Aptos Narrow" panose="020B0004020202020204" pitchFamily="34" charset="0"/>
+                        </a:rPr>
+                        <a:t>12</a:t>
+                      </a:r>
+                    </a:p>
+                  </a:txBody>
+                  <a:tcPr marL="7620" marR="7620" marT="7620" marB="0" anchor="b">
+                    <a:lnL w="6350" cap="flat" cmpd="sng" algn="ctr">
+                      <a:solidFill>
+                        <a:srgbClr val="000000"/>
+                      </a:solidFill>
+                      <a:prstDash val="solid"/>
+                      <a:round/>
+                      <a:headEnd type="none" w="med" len="med"/>
+                      <a:tailEnd type="none" w="med" len="med"/>
+                    </a:lnL>
+                    <a:lnR w="6350" cap="flat" cmpd="sng" algn="ctr">
+                      <a:solidFill>
+                        <a:srgbClr val="000000"/>
+                      </a:solidFill>
+                      <a:prstDash val="solid"/>
+                      <a:round/>
+                      <a:headEnd type="none" w="med" len="med"/>
+                      <a:tailEnd type="none" w="med" len="med"/>
+                    </a:lnR>
+                    <a:lnT w="6350" cap="flat" cmpd="sng" algn="ctr">
+                      <a:solidFill>
+                        <a:srgbClr val="000000"/>
+                      </a:solidFill>
+                      <a:prstDash val="solid"/>
+                      <a:round/>
+                      <a:headEnd type="none" w="med" len="med"/>
+                      <a:tailEnd type="none" w="med" len="med"/>
+                    </a:lnT>
+                    <a:lnB w="6350" cap="flat" cmpd="sng" algn="ctr">
+                      <a:solidFill>
+                        <a:srgbClr val="000000"/>
+                      </a:solidFill>
+                      <a:prstDash val="solid"/>
+                      <a:round/>
+                      <a:headEnd type="none" w="med" len="med"/>
+                      <a:tailEnd type="none" w="med" len="med"/>
+                    </a:lnB>
+                    <a:solidFill>
+                      <a:schemeClr val="bg1"/>
+                    </a:solidFill>
+                  </a:tcPr>
+                </a:tc>
+                <a:tc>
+                  <a:txBody>
+                    <a:bodyPr/>
+                    <a:lstStyle/>
+                    <a:p>
+                      <a:pPr algn="r" fontAlgn="b"/>
+                      <a:r>
+                        <a:rPr lang="en-CA" sz="1100" b="0" i="0" u="none" strike="noStrike">
+                          <a:solidFill>
+                            <a:srgbClr val="000000"/>
+                          </a:solidFill>
+                          <a:effectLst/>
+                          <a:latin typeface="Aptos Narrow" panose="020B0004020202020204" pitchFamily="34" charset="0"/>
+                        </a:rPr>
+                        <a:t>1</a:t>
+                      </a:r>
+                    </a:p>
+                  </a:txBody>
+                  <a:tcPr marL="7620" marR="7620" marT="7620" marB="0" anchor="b">
+                    <a:lnL w="6350" cap="flat" cmpd="sng" algn="ctr">
+                      <a:solidFill>
+                        <a:srgbClr val="000000"/>
+                      </a:solidFill>
+                      <a:prstDash val="solid"/>
+                      <a:round/>
+                      <a:headEnd type="none" w="med" len="med"/>
+                      <a:tailEnd type="none" w="med" len="med"/>
+                    </a:lnL>
+                    <a:lnR w="6350" cap="flat" cmpd="sng" algn="ctr">
+                      <a:solidFill>
+                        <a:srgbClr val="000000"/>
+                      </a:solidFill>
+                      <a:prstDash val="solid"/>
+                      <a:round/>
+                      <a:headEnd type="none" w="med" len="med"/>
+                      <a:tailEnd type="none" w="med" len="med"/>
+                    </a:lnR>
+                    <a:lnT w="6350" cap="flat" cmpd="sng" algn="ctr">
+                      <a:solidFill>
+                        <a:srgbClr val="000000"/>
+                      </a:solidFill>
+                      <a:prstDash val="solid"/>
+                      <a:round/>
+                      <a:headEnd type="none" w="med" len="med"/>
+                      <a:tailEnd type="none" w="med" len="med"/>
+                    </a:lnT>
+                    <a:lnB w="6350" cap="flat" cmpd="sng" algn="ctr">
+                      <a:solidFill>
+                        <a:srgbClr val="000000"/>
+                      </a:solidFill>
+                      <a:prstDash val="solid"/>
+                      <a:round/>
+                      <a:headEnd type="none" w="med" len="med"/>
+                      <a:tailEnd type="none" w="med" len="med"/>
+                    </a:lnB>
+                    <a:solidFill>
+                      <a:schemeClr val="bg1"/>
+                    </a:solidFill>
+                  </a:tcPr>
+                </a:tc>
+                <a:tc>
+                  <a:txBody>
+                    <a:bodyPr/>
+                    <a:lstStyle/>
+                    <a:p>
+                      <a:pPr algn="r" fontAlgn="b"/>
+                      <a:r>
+                        <a:rPr lang="en-CA" sz="1100" b="0" i="0" u="none" strike="noStrike">
+                          <a:solidFill>
+                            <a:srgbClr val="000000"/>
+                          </a:solidFill>
+                          <a:effectLst/>
+                          <a:latin typeface="Aptos Narrow" panose="020B0004020202020204" pitchFamily="34" charset="0"/>
+                        </a:rPr>
+                        <a:t>244</a:t>
+                      </a:r>
+                    </a:p>
+                  </a:txBody>
+                  <a:tcPr marL="7620" marR="7620" marT="7620" marB="0" anchor="b">
+                    <a:lnL w="6350" cap="flat" cmpd="sng" algn="ctr">
+                      <a:solidFill>
+                        <a:srgbClr val="000000"/>
+                      </a:solidFill>
+                      <a:prstDash val="solid"/>
+                      <a:round/>
+                      <a:headEnd type="none" w="med" len="med"/>
+                      <a:tailEnd type="none" w="med" len="med"/>
+                    </a:lnL>
+                    <a:lnR w="6350" cap="flat" cmpd="sng" algn="ctr">
+                      <a:solidFill>
+                        <a:srgbClr val="000000"/>
+                      </a:solidFill>
+                      <a:prstDash val="solid"/>
+                      <a:round/>
+                      <a:headEnd type="none" w="med" len="med"/>
+                      <a:tailEnd type="none" w="med" len="med"/>
+                    </a:lnR>
+                    <a:lnT w="6350" cap="flat" cmpd="sng" algn="ctr">
+                      <a:solidFill>
+                        <a:srgbClr val="000000"/>
+                      </a:solidFill>
+                      <a:prstDash val="solid"/>
+                      <a:round/>
+                      <a:headEnd type="none" w="med" len="med"/>
+                      <a:tailEnd type="none" w="med" len="med"/>
+                    </a:lnT>
+                    <a:lnB w="6350" cap="flat" cmpd="sng" algn="ctr">
+                      <a:solidFill>
+                        <a:srgbClr val="000000"/>
+                      </a:solidFill>
+                      <a:prstDash val="solid"/>
+                      <a:round/>
+                      <a:headEnd type="none" w="med" len="med"/>
+                      <a:tailEnd type="none" w="med" len="med"/>
+                    </a:lnB>
+                    <a:solidFill>
+                      <a:schemeClr val="bg1"/>
+                    </a:solidFill>
+                  </a:tcPr>
+                </a:tc>
+                <a:tc>
+                  <a:txBody>
+                    <a:bodyPr/>
+                    <a:lstStyle/>
+                    <a:p>
+                      <a:pPr algn="r" fontAlgn="b"/>
+                      <a:r>
+                        <a:rPr lang="en-CA" sz="1100" b="0" i="0" u="none" strike="noStrike">
+                          <a:solidFill>
+                            <a:srgbClr val="000000"/>
+                          </a:solidFill>
+                          <a:effectLst/>
+                          <a:latin typeface="Aptos Narrow" panose="020B0004020202020204" pitchFamily="34" charset="0"/>
+                        </a:rPr>
+                        <a:t>642</a:t>
+                      </a:r>
+                    </a:p>
+                  </a:txBody>
+                  <a:tcPr marL="7620" marR="7620" marT="7620" marB="0" anchor="b">
+                    <a:lnL w="6350" cap="flat" cmpd="sng" algn="ctr">
+                      <a:solidFill>
+                        <a:srgbClr val="000000"/>
+                      </a:solidFill>
+                      <a:prstDash val="solid"/>
+                      <a:round/>
+                      <a:headEnd type="none" w="med" len="med"/>
+                      <a:tailEnd type="none" w="med" len="med"/>
+                    </a:lnL>
+                    <a:lnR w="6350" cap="flat" cmpd="sng" algn="ctr">
+                      <a:solidFill>
+                        <a:srgbClr val="000000"/>
+                      </a:solidFill>
+                      <a:prstDash val="solid"/>
+                      <a:round/>
+                      <a:headEnd type="none" w="med" len="med"/>
+                      <a:tailEnd type="none" w="med" len="med"/>
+                    </a:lnR>
+                    <a:lnT w="6350" cap="flat" cmpd="sng" algn="ctr">
+                      <a:solidFill>
+                        <a:srgbClr val="000000"/>
+                      </a:solidFill>
+                      <a:prstDash val="solid"/>
+                      <a:round/>
+                      <a:headEnd type="none" w="med" len="med"/>
+                      <a:tailEnd type="none" w="med" len="med"/>
+                    </a:lnT>
+                    <a:lnB w="6350" cap="flat" cmpd="sng" algn="ctr">
+                      <a:solidFill>
+                        <a:srgbClr val="000000"/>
+                      </a:solidFill>
+                      <a:prstDash val="solid"/>
+                      <a:round/>
+                      <a:headEnd type="none" w="med" len="med"/>
+                      <a:tailEnd type="none" w="med" len="med"/>
+                    </a:lnB>
+                    <a:solidFill>
+                      <a:schemeClr val="bg1"/>
+                    </a:solidFill>
+                  </a:tcPr>
+                </a:tc>
+                <a:extLst>
+                  <a:ext uri="{0D108BD9-81ED-4DB2-BD59-A6C34878D82A}">
+                    <a16:rowId xmlns:a16="http://schemas.microsoft.com/office/drawing/2014/main" val="3972221917"/>
+                  </a:ext>
+                </a:extLst>
+              </a:tr>
+              <a:tr h="182880">
+                <a:tc>
+                  <a:txBody>
+                    <a:bodyPr/>
+                    <a:lstStyle/>
+                    <a:p>
+                      <a:pPr algn="r" fontAlgn="b"/>
+                      <a:r>
+                        <a:rPr lang="en-CA" sz="1100" b="0" i="0" u="none" strike="noStrike">
+                          <a:solidFill>
+                            <a:srgbClr val="000000"/>
+                          </a:solidFill>
+                          <a:effectLst/>
+                          <a:latin typeface="Aptos Narrow" panose="020B0004020202020204" pitchFamily="34" charset="0"/>
+                        </a:rPr>
+                        <a:t>12</a:t>
+                      </a:r>
+                    </a:p>
+                  </a:txBody>
+                  <a:tcPr marL="7620" marR="7620" marT="7620" marB="0" anchor="b">
+                    <a:lnL w="6350" cap="flat" cmpd="sng" algn="ctr">
+                      <a:solidFill>
+                        <a:srgbClr val="000000"/>
+                      </a:solidFill>
+                      <a:prstDash val="solid"/>
+                      <a:round/>
+                      <a:headEnd type="none" w="med" len="med"/>
+                      <a:tailEnd type="none" w="med" len="med"/>
+                    </a:lnL>
+                    <a:lnR w="6350" cap="flat" cmpd="sng" algn="ctr">
+                      <a:solidFill>
+                        <a:srgbClr val="000000"/>
+                      </a:solidFill>
+                      <a:prstDash val="solid"/>
+                      <a:round/>
+                      <a:headEnd type="none" w="med" len="med"/>
+                      <a:tailEnd type="none" w="med" len="med"/>
+                    </a:lnR>
+                    <a:lnT w="6350" cap="flat" cmpd="sng" algn="ctr">
+                      <a:solidFill>
+                        <a:srgbClr val="000000"/>
+                      </a:solidFill>
+                      <a:prstDash val="solid"/>
+                      <a:round/>
+                      <a:headEnd type="none" w="med" len="med"/>
+                      <a:tailEnd type="none" w="med" len="med"/>
+                    </a:lnT>
+                    <a:lnB w="6350" cap="flat" cmpd="sng" algn="ctr">
+                      <a:solidFill>
+                        <a:srgbClr val="000000"/>
+                      </a:solidFill>
+                      <a:prstDash val="solid"/>
+                      <a:round/>
+                      <a:headEnd type="none" w="med" len="med"/>
+                      <a:tailEnd type="none" w="med" len="med"/>
+                    </a:lnB>
+                    <a:solidFill>
+                      <a:schemeClr val="bg1"/>
+                    </a:solidFill>
+                  </a:tcPr>
+                </a:tc>
+                <a:tc>
+                  <a:txBody>
+                    <a:bodyPr/>
+                    <a:lstStyle/>
+                    <a:p>
+                      <a:pPr algn="r" fontAlgn="b"/>
+                      <a:r>
+                        <a:rPr lang="en-CA" sz="1100" b="0" i="0" u="none" strike="noStrike">
+                          <a:solidFill>
+                            <a:srgbClr val="000000"/>
+                          </a:solidFill>
+                          <a:effectLst/>
+                          <a:latin typeface="Aptos Narrow" panose="020B0004020202020204" pitchFamily="34" charset="0"/>
+                        </a:rPr>
+                        <a:t>2</a:t>
+                      </a:r>
+                    </a:p>
+                  </a:txBody>
+                  <a:tcPr marL="7620" marR="7620" marT="7620" marB="0" anchor="b">
+                    <a:lnL w="6350" cap="flat" cmpd="sng" algn="ctr">
+                      <a:solidFill>
+                        <a:srgbClr val="000000"/>
+                      </a:solidFill>
+                      <a:prstDash val="solid"/>
+                      <a:round/>
+                      <a:headEnd type="none" w="med" len="med"/>
+                      <a:tailEnd type="none" w="med" len="med"/>
+                    </a:lnL>
+                    <a:lnR w="6350" cap="flat" cmpd="sng" algn="ctr">
+                      <a:solidFill>
+                        <a:srgbClr val="000000"/>
+                      </a:solidFill>
+                      <a:prstDash val="solid"/>
+                      <a:round/>
+                      <a:headEnd type="none" w="med" len="med"/>
+                      <a:tailEnd type="none" w="med" len="med"/>
+                    </a:lnR>
+                    <a:lnT w="6350" cap="flat" cmpd="sng" algn="ctr">
+                      <a:solidFill>
+                        <a:srgbClr val="000000"/>
+                      </a:solidFill>
+                      <a:prstDash val="solid"/>
+                      <a:round/>
+                      <a:headEnd type="none" w="med" len="med"/>
+                      <a:tailEnd type="none" w="med" len="med"/>
+                    </a:lnT>
+                    <a:lnB w="6350" cap="flat" cmpd="sng" algn="ctr">
+                      <a:solidFill>
+                        <a:srgbClr val="000000"/>
+                      </a:solidFill>
+                      <a:prstDash val="solid"/>
+                      <a:round/>
+                      <a:headEnd type="none" w="med" len="med"/>
+                      <a:tailEnd type="none" w="med" len="med"/>
+                    </a:lnB>
+                    <a:solidFill>
+                      <a:schemeClr val="bg1"/>
+                    </a:solidFill>
+                  </a:tcPr>
+                </a:tc>
+                <a:tc>
+                  <a:txBody>
+                    <a:bodyPr/>
+                    <a:lstStyle/>
+                    <a:p>
+                      <a:pPr algn="r" fontAlgn="b"/>
+                      <a:r>
+                        <a:rPr lang="en-CA" sz="1100" b="0" i="0" u="none" strike="noStrike">
+                          <a:solidFill>
+                            <a:srgbClr val="000000"/>
+                          </a:solidFill>
+                          <a:effectLst/>
+                          <a:latin typeface="Aptos Narrow" panose="020B0004020202020204" pitchFamily="34" charset="0"/>
+                        </a:rPr>
+                        <a:t>140</a:t>
+                      </a:r>
+                    </a:p>
+                  </a:txBody>
+                  <a:tcPr marL="7620" marR="7620" marT="7620" marB="0" anchor="b">
+                    <a:lnL w="6350" cap="flat" cmpd="sng" algn="ctr">
+                      <a:solidFill>
+                        <a:srgbClr val="000000"/>
+                      </a:solidFill>
+                      <a:prstDash val="solid"/>
+                      <a:round/>
+                      <a:headEnd type="none" w="med" len="med"/>
+                      <a:tailEnd type="none" w="med" len="med"/>
+                    </a:lnL>
+                    <a:lnR w="6350" cap="flat" cmpd="sng" algn="ctr">
+                      <a:solidFill>
+                        <a:srgbClr val="000000"/>
+                      </a:solidFill>
+                      <a:prstDash val="solid"/>
+                      <a:round/>
+                      <a:headEnd type="none" w="med" len="med"/>
+                      <a:tailEnd type="none" w="med" len="med"/>
+                    </a:lnR>
+                    <a:lnT w="6350" cap="flat" cmpd="sng" algn="ctr">
+                      <a:solidFill>
+                        <a:srgbClr val="000000"/>
+                      </a:solidFill>
+                      <a:prstDash val="solid"/>
+                      <a:round/>
+                      <a:headEnd type="none" w="med" len="med"/>
+                      <a:tailEnd type="none" w="med" len="med"/>
+                    </a:lnT>
+                    <a:lnB w="6350" cap="flat" cmpd="sng" algn="ctr">
+                      <a:solidFill>
+                        <a:srgbClr val="000000"/>
+                      </a:solidFill>
+                      <a:prstDash val="solid"/>
+                      <a:round/>
+                      <a:headEnd type="none" w="med" len="med"/>
+                      <a:tailEnd type="none" w="med" len="med"/>
+                    </a:lnB>
+                    <a:solidFill>
+                      <a:schemeClr val="bg1"/>
+                    </a:solidFill>
+                  </a:tcPr>
+                </a:tc>
+                <a:tc>
+                  <a:txBody>
+                    <a:bodyPr/>
+                    <a:lstStyle/>
+                    <a:p>
+                      <a:pPr algn="r" fontAlgn="b"/>
+                      <a:r>
+                        <a:rPr lang="en-CA" sz="1100" b="0" i="0" u="none" strike="noStrike">
+                          <a:solidFill>
+                            <a:srgbClr val="000000"/>
+                          </a:solidFill>
+                          <a:effectLst/>
+                          <a:latin typeface="Aptos Narrow" panose="020B0004020202020204" pitchFamily="34" charset="0"/>
+                        </a:rPr>
+                        <a:t>656</a:t>
+                      </a:r>
+                    </a:p>
+                  </a:txBody>
+                  <a:tcPr marL="7620" marR="7620" marT="7620" marB="0" anchor="b">
+                    <a:lnL w="6350" cap="flat" cmpd="sng" algn="ctr">
+                      <a:solidFill>
+                        <a:srgbClr val="000000"/>
+                      </a:solidFill>
+                      <a:prstDash val="solid"/>
+                      <a:round/>
+                      <a:headEnd type="none" w="med" len="med"/>
+                      <a:tailEnd type="none" w="med" len="med"/>
+                    </a:lnL>
+                    <a:lnR w="6350" cap="flat" cmpd="sng" algn="ctr">
+                      <a:solidFill>
+                        <a:srgbClr val="000000"/>
+                      </a:solidFill>
+                      <a:prstDash val="solid"/>
+                      <a:round/>
+                      <a:headEnd type="none" w="med" len="med"/>
+                      <a:tailEnd type="none" w="med" len="med"/>
+                    </a:lnR>
+                    <a:lnT w="6350" cap="flat" cmpd="sng" algn="ctr">
+                      <a:solidFill>
+                        <a:srgbClr val="000000"/>
+                      </a:solidFill>
+                      <a:prstDash val="solid"/>
+                      <a:round/>
+                      <a:headEnd type="none" w="med" len="med"/>
+                      <a:tailEnd type="none" w="med" len="med"/>
+                    </a:lnT>
+                    <a:lnB w="6350" cap="flat" cmpd="sng" algn="ctr">
+                      <a:solidFill>
+                        <a:srgbClr val="000000"/>
+                      </a:solidFill>
+                      <a:prstDash val="solid"/>
+                      <a:round/>
+                      <a:headEnd type="none" w="med" len="med"/>
+                      <a:tailEnd type="none" w="med" len="med"/>
+                    </a:lnB>
+                    <a:solidFill>
+                      <a:schemeClr val="bg1"/>
+                    </a:solidFill>
+                  </a:tcPr>
+                </a:tc>
+                <a:extLst>
+                  <a:ext uri="{0D108BD9-81ED-4DB2-BD59-A6C34878D82A}">
+                    <a16:rowId xmlns:a16="http://schemas.microsoft.com/office/drawing/2014/main" val="135821798"/>
+                  </a:ext>
+                </a:extLst>
+              </a:tr>
+              <a:tr h="182880">
+                <a:tc>
+                  <a:txBody>
+                    <a:bodyPr/>
+                    <a:lstStyle/>
+                    <a:p>
+                      <a:pPr algn="r" fontAlgn="b"/>
+                      <a:r>
+                        <a:rPr lang="en-CA" sz="1100" b="0" i="0" u="none" strike="noStrike">
+                          <a:solidFill>
+                            <a:srgbClr val="000000"/>
+                          </a:solidFill>
+                          <a:effectLst/>
+                          <a:latin typeface="Aptos Narrow" panose="020B0004020202020204" pitchFamily="34" charset="0"/>
+                        </a:rPr>
+                        <a:t>4</a:t>
+                      </a:r>
+                    </a:p>
+                  </a:txBody>
+                  <a:tcPr marL="7620" marR="7620" marT="7620" marB="0" anchor="b">
+                    <a:lnL w="6350" cap="flat" cmpd="sng" algn="ctr">
+                      <a:solidFill>
+                        <a:srgbClr val="000000"/>
+                      </a:solidFill>
+                      <a:prstDash val="solid"/>
+                      <a:round/>
+                      <a:headEnd type="none" w="med" len="med"/>
+                      <a:tailEnd type="none" w="med" len="med"/>
+                    </a:lnL>
+                    <a:lnR w="6350" cap="flat" cmpd="sng" algn="ctr">
+                      <a:solidFill>
+                        <a:srgbClr val="000000"/>
+                      </a:solidFill>
+                      <a:prstDash val="solid"/>
+                      <a:round/>
+                      <a:headEnd type="none" w="med" len="med"/>
+                      <a:tailEnd type="none" w="med" len="med"/>
+                    </a:lnR>
+                    <a:lnT w="6350" cap="flat" cmpd="sng" algn="ctr">
+                      <a:solidFill>
+                        <a:srgbClr val="000000"/>
+                      </a:solidFill>
+                      <a:prstDash val="solid"/>
+                      <a:round/>
+                      <a:headEnd type="none" w="med" len="med"/>
+                      <a:tailEnd type="none" w="med" len="med"/>
+                    </a:lnT>
+                    <a:lnB w="6350" cap="flat" cmpd="sng" algn="ctr">
+                      <a:solidFill>
+                        <a:srgbClr val="000000"/>
+                      </a:solidFill>
+                      <a:prstDash val="solid"/>
+                      <a:round/>
+                      <a:headEnd type="none" w="med" len="med"/>
+                      <a:tailEnd type="none" w="med" len="med"/>
+                    </a:lnB>
+                    <a:solidFill>
+                      <a:schemeClr val="bg1"/>
+                    </a:solidFill>
+                  </a:tcPr>
+                </a:tc>
+                <a:tc>
+                  <a:txBody>
+                    <a:bodyPr/>
+                    <a:lstStyle/>
+                    <a:p>
+                      <a:pPr algn="r" fontAlgn="b"/>
+                      <a:r>
+                        <a:rPr lang="en-CA" sz="1100" b="0" i="0" u="none" strike="noStrike">
+                          <a:solidFill>
+                            <a:srgbClr val="000000"/>
+                          </a:solidFill>
+                          <a:effectLst/>
+                          <a:latin typeface="Aptos Narrow" panose="020B0004020202020204" pitchFamily="34" charset="0"/>
+                        </a:rPr>
+                        <a:t>2</a:t>
+                      </a:r>
+                    </a:p>
+                  </a:txBody>
+                  <a:tcPr marL="7620" marR="7620" marT="7620" marB="0" anchor="b">
+                    <a:lnL w="6350" cap="flat" cmpd="sng" algn="ctr">
+                      <a:solidFill>
+                        <a:srgbClr val="000000"/>
+                      </a:solidFill>
+                      <a:prstDash val="solid"/>
+                      <a:round/>
+                      <a:headEnd type="none" w="med" len="med"/>
+                      <a:tailEnd type="none" w="med" len="med"/>
+                    </a:lnL>
+                    <a:lnR w="6350" cap="flat" cmpd="sng" algn="ctr">
+                      <a:solidFill>
+                        <a:srgbClr val="000000"/>
+                      </a:solidFill>
+                      <a:prstDash val="solid"/>
+                      <a:round/>
+                      <a:headEnd type="none" w="med" len="med"/>
+                      <a:tailEnd type="none" w="med" len="med"/>
+                    </a:lnR>
+                    <a:lnT w="6350" cap="flat" cmpd="sng" algn="ctr">
+                      <a:solidFill>
+                        <a:srgbClr val="000000"/>
+                      </a:solidFill>
+                      <a:prstDash val="solid"/>
+                      <a:round/>
+                      <a:headEnd type="none" w="med" len="med"/>
+                      <a:tailEnd type="none" w="med" len="med"/>
+                    </a:lnT>
+                    <a:lnB w="6350" cap="flat" cmpd="sng" algn="ctr">
+                      <a:solidFill>
+                        <a:srgbClr val="000000"/>
+                      </a:solidFill>
+                      <a:prstDash val="solid"/>
+                      <a:round/>
+                      <a:headEnd type="none" w="med" len="med"/>
+                      <a:tailEnd type="none" w="med" len="med"/>
+                    </a:lnB>
+                    <a:solidFill>
+                      <a:schemeClr val="bg1"/>
+                    </a:solidFill>
+                  </a:tcPr>
+                </a:tc>
+                <a:tc>
+                  <a:txBody>
+                    <a:bodyPr/>
+                    <a:lstStyle/>
+                    <a:p>
+                      <a:pPr algn="r" fontAlgn="b"/>
+                      <a:r>
+                        <a:rPr lang="en-CA" sz="1100" b="0" i="0" u="none" strike="noStrike">
+                          <a:solidFill>
+                            <a:srgbClr val="000000"/>
+                          </a:solidFill>
+                          <a:effectLst/>
+                          <a:latin typeface="Aptos Narrow" panose="020B0004020202020204" pitchFamily="34" charset="0"/>
+                        </a:rPr>
+                        <a:t>269</a:t>
+                      </a:r>
+                    </a:p>
+                  </a:txBody>
+                  <a:tcPr marL="7620" marR="7620" marT="7620" marB="0" anchor="b">
+                    <a:lnL w="6350" cap="flat" cmpd="sng" algn="ctr">
+                      <a:solidFill>
+                        <a:srgbClr val="000000"/>
+                      </a:solidFill>
+                      <a:prstDash val="solid"/>
+                      <a:round/>
+                      <a:headEnd type="none" w="med" len="med"/>
+                      <a:tailEnd type="none" w="med" len="med"/>
+                    </a:lnL>
+                    <a:lnR w="6350" cap="flat" cmpd="sng" algn="ctr">
+                      <a:solidFill>
+                        <a:srgbClr val="000000"/>
+                      </a:solidFill>
+                      <a:prstDash val="solid"/>
+                      <a:round/>
+                      <a:headEnd type="none" w="med" len="med"/>
+                      <a:tailEnd type="none" w="med" len="med"/>
+                    </a:lnR>
+                    <a:lnT w="6350" cap="flat" cmpd="sng" algn="ctr">
+                      <a:solidFill>
+                        <a:srgbClr val="000000"/>
+                      </a:solidFill>
+                      <a:prstDash val="solid"/>
+                      <a:round/>
+                      <a:headEnd type="none" w="med" len="med"/>
+                      <a:tailEnd type="none" w="med" len="med"/>
+                    </a:lnT>
+                    <a:lnB w="6350" cap="flat" cmpd="sng" algn="ctr">
+                      <a:solidFill>
+                        <a:srgbClr val="000000"/>
+                      </a:solidFill>
+                      <a:prstDash val="solid"/>
+                      <a:round/>
+                      <a:headEnd type="none" w="med" len="med"/>
+                      <a:tailEnd type="none" w="med" len="med"/>
+                    </a:lnB>
+                    <a:solidFill>
+                      <a:schemeClr val="bg1"/>
+                    </a:solidFill>
+                  </a:tcPr>
+                </a:tc>
+                <a:tc>
+                  <a:txBody>
+                    <a:bodyPr/>
+                    <a:lstStyle/>
+                    <a:p>
+                      <a:pPr algn="r" fontAlgn="b"/>
+                      <a:r>
+                        <a:rPr lang="en-CA" sz="1100" b="0" i="0" u="none" strike="noStrike">
+                          <a:solidFill>
+                            <a:srgbClr val="000000"/>
+                          </a:solidFill>
+                          <a:effectLst/>
+                          <a:latin typeface="Aptos Narrow" panose="020B0004020202020204" pitchFamily="34" charset="0"/>
+                        </a:rPr>
+                        <a:t>623</a:t>
+                      </a:r>
+                    </a:p>
+                  </a:txBody>
+                  <a:tcPr marL="7620" marR="7620" marT="7620" marB="0" anchor="b">
+                    <a:lnL w="6350" cap="flat" cmpd="sng" algn="ctr">
+                      <a:solidFill>
+                        <a:srgbClr val="000000"/>
+                      </a:solidFill>
+                      <a:prstDash val="solid"/>
+                      <a:round/>
+                      <a:headEnd type="none" w="med" len="med"/>
+                      <a:tailEnd type="none" w="med" len="med"/>
+                    </a:lnL>
+                    <a:lnR w="6350" cap="flat" cmpd="sng" algn="ctr">
+                      <a:solidFill>
+                        <a:srgbClr val="000000"/>
+                      </a:solidFill>
+                      <a:prstDash val="solid"/>
+                      <a:round/>
+                      <a:headEnd type="none" w="med" len="med"/>
+                      <a:tailEnd type="none" w="med" len="med"/>
+                    </a:lnR>
+                    <a:lnT w="6350" cap="flat" cmpd="sng" algn="ctr">
+                      <a:solidFill>
+                        <a:srgbClr val="000000"/>
+                      </a:solidFill>
+                      <a:prstDash val="solid"/>
+                      <a:round/>
+                      <a:headEnd type="none" w="med" len="med"/>
+                      <a:tailEnd type="none" w="med" len="med"/>
+                    </a:lnT>
+                    <a:lnB w="6350" cap="flat" cmpd="sng" algn="ctr">
+                      <a:solidFill>
+                        <a:srgbClr val="000000"/>
+                      </a:solidFill>
+                      <a:prstDash val="solid"/>
+                      <a:round/>
+                      <a:headEnd type="none" w="med" len="med"/>
+                      <a:tailEnd type="none" w="med" len="med"/>
+                    </a:lnB>
+                    <a:solidFill>
+                      <a:schemeClr val="bg1"/>
+                    </a:solidFill>
+                  </a:tcPr>
+                </a:tc>
+                <a:extLst>
+                  <a:ext uri="{0D108BD9-81ED-4DB2-BD59-A6C34878D82A}">
+                    <a16:rowId xmlns:a16="http://schemas.microsoft.com/office/drawing/2014/main" val="352832134"/>
+                  </a:ext>
+                </a:extLst>
+              </a:tr>
+              <a:tr h="182880">
+                <a:tc>
+                  <a:txBody>
+                    <a:bodyPr/>
+                    <a:lstStyle/>
+                    <a:p>
+                      <a:pPr algn="r" fontAlgn="b"/>
+                      <a:r>
+                        <a:rPr lang="en-CA" sz="1100" b="0" i="0" u="none" strike="noStrike">
+                          <a:solidFill>
+                            <a:srgbClr val="000000"/>
+                          </a:solidFill>
+                          <a:effectLst/>
+                          <a:latin typeface="Aptos Narrow" panose="020B0004020202020204" pitchFamily="34" charset="0"/>
+                        </a:rPr>
+                        <a:t>4</a:t>
+                      </a:r>
+                    </a:p>
+                  </a:txBody>
+                  <a:tcPr marL="7620" marR="7620" marT="7620" marB="0" anchor="b">
+                    <a:lnL w="6350" cap="flat" cmpd="sng" algn="ctr">
+                      <a:solidFill>
+                        <a:srgbClr val="000000"/>
+                      </a:solidFill>
+                      <a:prstDash val="solid"/>
+                      <a:round/>
+                      <a:headEnd type="none" w="med" len="med"/>
+                      <a:tailEnd type="none" w="med" len="med"/>
+                    </a:lnL>
+                    <a:lnR w="6350" cap="flat" cmpd="sng" algn="ctr">
+                      <a:solidFill>
+                        <a:srgbClr val="000000"/>
+                      </a:solidFill>
+                      <a:prstDash val="solid"/>
+                      <a:round/>
+                      <a:headEnd type="none" w="med" len="med"/>
+                      <a:tailEnd type="none" w="med" len="med"/>
+                    </a:lnR>
+                    <a:lnT w="6350" cap="flat" cmpd="sng" algn="ctr">
+                      <a:solidFill>
+                        <a:srgbClr val="000000"/>
+                      </a:solidFill>
+                      <a:prstDash val="solid"/>
+                      <a:round/>
+                      <a:headEnd type="none" w="med" len="med"/>
+                      <a:tailEnd type="none" w="med" len="med"/>
+                    </a:lnT>
+                    <a:lnB w="6350" cap="flat" cmpd="sng" algn="ctr">
+                      <a:solidFill>
+                        <a:srgbClr val="000000"/>
+                      </a:solidFill>
+                      <a:prstDash val="solid"/>
+                      <a:round/>
+                      <a:headEnd type="none" w="med" len="med"/>
+                      <a:tailEnd type="none" w="med" len="med"/>
+                    </a:lnB>
+                    <a:solidFill>
+                      <a:schemeClr val="bg1"/>
+                    </a:solidFill>
+                  </a:tcPr>
+                </a:tc>
+                <a:tc>
+                  <a:txBody>
+                    <a:bodyPr/>
+                    <a:lstStyle/>
+                    <a:p>
+                      <a:pPr algn="r" fontAlgn="b"/>
+                      <a:r>
+                        <a:rPr lang="en-CA" sz="1100" b="0" i="0" u="none" strike="noStrike">
+                          <a:solidFill>
+                            <a:srgbClr val="000000"/>
+                          </a:solidFill>
+                          <a:effectLst/>
+                          <a:latin typeface="Aptos Narrow" panose="020B0004020202020204" pitchFamily="34" charset="0"/>
+                        </a:rPr>
+                        <a:t>3</a:t>
+                      </a:r>
+                    </a:p>
+                  </a:txBody>
+                  <a:tcPr marL="7620" marR="7620" marT="7620" marB="0" anchor="b">
+                    <a:lnL w="6350" cap="flat" cmpd="sng" algn="ctr">
+                      <a:solidFill>
+                        <a:srgbClr val="000000"/>
+                      </a:solidFill>
+                      <a:prstDash val="solid"/>
+                      <a:round/>
+                      <a:headEnd type="none" w="med" len="med"/>
+                      <a:tailEnd type="none" w="med" len="med"/>
+                    </a:lnL>
+                    <a:lnR w="6350" cap="flat" cmpd="sng" algn="ctr">
+                      <a:solidFill>
+                        <a:srgbClr val="000000"/>
+                      </a:solidFill>
+                      <a:prstDash val="solid"/>
+                      <a:round/>
+                      <a:headEnd type="none" w="med" len="med"/>
+                      <a:tailEnd type="none" w="med" len="med"/>
+                    </a:lnR>
+                    <a:lnT w="6350" cap="flat" cmpd="sng" algn="ctr">
+                      <a:solidFill>
+                        <a:srgbClr val="000000"/>
+                      </a:solidFill>
+                      <a:prstDash val="solid"/>
+                      <a:round/>
+                      <a:headEnd type="none" w="med" len="med"/>
+                      <a:tailEnd type="none" w="med" len="med"/>
+                    </a:lnT>
+                    <a:lnB w="6350" cap="flat" cmpd="sng" algn="ctr">
+                      <a:solidFill>
+                        <a:srgbClr val="000000"/>
+                      </a:solidFill>
+                      <a:prstDash val="solid"/>
+                      <a:round/>
+                      <a:headEnd type="none" w="med" len="med"/>
+                      <a:tailEnd type="none" w="med" len="med"/>
+                    </a:lnB>
+                    <a:solidFill>
+                      <a:schemeClr val="bg1"/>
+                    </a:solidFill>
+                  </a:tcPr>
+                </a:tc>
+                <a:tc>
+                  <a:txBody>
+                    <a:bodyPr/>
+                    <a:lstStyle/>
+                    <a:p>
+                      <a:pPr algn="r" fontAlgn="b"/>
+                      <a:r>
+                        <a:rPr lang="en-CA" sz="1100" b="0" i="0" u="none" strike="noStrike">
+                          <a:solidFill>
+                            <a:srgbClr val="000000"/>
+                          </a:solidFill>
+                          <a:effectLst/>
+                          <a:latin typeface="Aptos Narrow" panose="020B0004020202020204" pitchFamily="34" charset="0"/>
+                        </a:rPr>
+                        <a:t>251</a:t>
+                      </a:r>
+                    </a:p>
+                  </a:txBody>
+                  <a:tcPr marL="7620" marR="7620" marT="7620" marB="0" anchor="b">
+                    <a:lnL w="6350" cap="flat" cmpd="sng" algn="ctr">
+                      <a:solidFill>
+                        <a:srgbClr val="000000"/>
+                      </a:solidFill>
+                      <a:prstDash val="solid"/>
+                      <a:round/>
+                      <a:headEnd type="none" w="med" len="med"/>
+                      <a:tailEnd type="none" w="med" len="med"/>
+                    </a:lnL>
+                    <a:lnR w="6350" cap="flat" cmpd="sng" algn="ctr">
+                      <a:solidFill>
+                        <a:srgbClr val="000000"/>
+                      </a:solidFill>
+                      <a:prstDash val="solid"/>
+                      <a:round/>
+                      <a:headEnd type="none" w="med" len="med"/>
+                      <a:tailEnd type="none" w="med" len="med"/>
+                    </a:lnR>
+                    <a:lnT w="6350" cap="flat" cmpd="sng" algn="ctr">
+                      <a:solidFill>
+                        <a:srgbClr val="000000"/>
+                      </a:solidFill>
+                      <a:prstDash val="solid"/>
+                      <a:round/>
+                      <a:headEnd type="none" w="med" len="med"/>
+                      <a:tailEnd type="none" w="med" len="med"/>
+                    </a:lnT>
+                    <a:lnB w="6350" cap="flat" cmpd="sng" algn="ctr">
+                      <a:solidFill>
+                        <a:srgbClr val="000000"/>
+                      </a:solidFill>
+                      <a:prstDash val="solid"/>
+                      <a:round/>
+                      <a:headEnd type="none" w="med" len="med"/>
+                      <a:tailEnd type="none" w="med" len="med"/>
+                    </a:lnB>
+                    <a:solidFill>
+                      <a:schemeClr val="bg1"/>
+                    </a:solidFill>
+                  </a:tcPr>
+                </a:tc>
+                <a:tc>
+                  <a:txBody>
+                    <a:bodyPr/>
+                    <a:lstStyle/>
+                    <a:p>
+                      <a:pPr algn="r" fontAlgn="b"/>
+                      <a:r>
+                        <a:rPr lang="en-CA" sz="1100" b="0" i="0" u="none" strike="noStrike">
+                          <a:solidFill>
+                            <a:srgbClr val="000000"/>
+                          </a:solidFill>
+                          <a:effectLst/>
+                          <a:latin typeface="Aptos Narrow" panose="020B0004020202020204" pitchFamily="34" charset="0"/>
+                        </a:rPr>
+                        <a:t>628</a:t>
+                      </a:r>
+                    </a:p>
+                  </a:txBody>
+                  <a:tcPr marL="7620" marR="7620" marT="7620" marB="0" anchor="b">
+                    <a:lnL w="6350" cap="flat" cmpd="sng" algn="ctr">
+                      <a:solidFill>
+                        <a:srgbClr val="000000"/>
+                      </a:solidFill>
+                      <a:prstDash val="solid"/>
+                      <a:round/>
+                      <a:headEnd type="none" w="med" len="med"/>
+                      <a:tailEnd type="none" w="med" len="med"/>
+                    </a:lnL>
+                    <a:lnR w="6350" cap="flat" cmpd="sng" algn="ctr">
+                      <a:solidFill>
+                        <a:srgbClr val="000000"/>
+                      </a:solidFill>
+                      <a:prstDash val="solid"/>
+                      <a:round/>
+                      <a:headEnd type="none" w="med" len="med"/>
+                      <a:tailEnd type="none" w="med" len="med"/>
+                    </a:lnR>
+                    <a:lnT w="6350" cap="flat" cmpd="sng" algn="ctr">
+                      <a:solidFill>
+                        <a:srgbClr val="000000"/>
+                      </a:solidFill>
+                      <a:prstDash val="solid"/>
+                      <a:round/>
+                      <a:headEnd type="none" w="med" len="med"/>
+                      <a:tailEnd type="none" w="med" len="med"/>
+                    </a:lnT>
+                    <a:lnB w="6350" cap="flat" cmpd="sng" algn="ctr">
+                      <a:solidFill>
+                        <a:srgbClr val="000000"/>
+                      </a:solidFill>
+                      <a:prstDash val="solid"/>
+                      <a:round/>
+                      <a:headEnd type="none" w="med" len="med"/>
+                      <a:tailEnd type="none" w="med" len="med"/>
+                    </a:lnB>
+                    <a:solidFill>
+                      <a:schemeClr val="bg1"/>
+                    </a:solidFill>
+                  </a:tcPr>
+                </a:tc>
+                <a:extLst>
+                  <a:ext uri="{0D108BD9-81ED-4DB2-BD59-A6C34878D82A}">
+                    <a16:rowId xmlns:a16="http://schemas.microsoft.com/office/drawing/2014/main" val="2633281499"/>
+                  </a:ext>
+                </a:extLst>
+              </a:tr>
+              <a:tr h="182880">
+                <a:tc>
+                  <a:txBody>
+                    <a:bodyPr/>
+                    <a:lstStyle/>
+                    <a:p>
+                      <a:pPr algn="r" fontAlgn="b"/>
+                      <a:r>
+                        <a:rPr lang="en-CA" sz="1100" b="0" i="0" u="none" strike="noStrike">
+                          <a:solidFill>
+                            <a:srgbClr val="000000"/>
+                          </a:solidFill>
+                          <a:effectLst/>
+                          <a:latin typeface="Aptos Narrow" panose="020B0004020202020204" pitchFamily="34" charset="0"/>
+                        </a:rPr>
+                        <a:t>16</a:t>
+                      </a:r>
+                    </a:p>
+                  </a:txBody>
+                  <a:tcPr marL="7620" marR="7620" marT="7620" marB="0" anchor="b">
+                    <a:lnL w="6350" cap="flat" cmpd="sng" algn="ctr">
+                      <a:solidFill>
+                        <a:srgbClr val="000000"/>
+                      </a:solidFill>
+                      <a:prstDash val="solid"/>
+                      <a:round/>
+                      <a:headEnd type="none" w="med" len="med"/>
+                      <a:tailEnd type="none" w="med" len="med"/>
+                    </a:lnL>
+                    <a:lnR w="6350" cap="flat" cmpd="sng" algn="ctr">
+                      <a:solidFill>
+                        <a:srgbClr val="000000"/>
+                      </a:solidFill>
+                      <a:prstDash val="solid"/>
+                      <a:round/>
+                      <a:headEnd type="none" w="med" len="med"/>
+                      <a:tailEnd type="none" w="med" len="med"/>
+                    </a:lnR>
+                    <a:lnT w="6350" cap="flat" cmpd="sng" algn="ctr">
+                      <a:solidFill>
+                        <a:srgbClr val="000000"/>
+                      </a:solidFill>
+                      <a:prstDash val="solid"/>
+                      <a:round/>
+                      <a:headEnd type="none" w="med" len="med"/>
+                      <a:tailEnd type="none" w="med" len="med"/>
+                    </a:lnT>
+                    <a:lnB w="6350" cap="flat" cmpd="sng" algn="ctr">
+                      <a:solidFill>
+                        <a:srgbClr val="000000"/>
+                      </a:solidFill>
+                      <a:prstDash val="solid"/>
+                      <a:round/>
+                      <a:headEnd type="none" w="med" len="med"/>
+                      <a:tailEnd type="none" w="med" len="med"/>
+                    </a:lnB>
+                    <a:solidFill>
+                      <a:schemeClr val="bg1"/>
+                    </a:solidFill>
+                  </a:tcPr>
+                </a:tc>
+                <a:tc>
+                  <a:txBody>
+                    <a:bodyPr/>
+                    <a:lstStyle/>
+                    <a:p>
+                      <a:pPr algn="r" fontAlgn="b"/>
+                      <a:r>
+                        <a:rPr lang="en-CA" sz="1100" b="0" i="0" u="none" strike="noStrike">
+                          <a:solidFill>
+                            <a:srgbClr val="000000"/>
+                          </a:solidFill>
+                          <a:effectLst/>
+                          <a:latin typeface="Aptos Narrow" panose="020B0004020202020204" pitchFamily="34" charset="0"/>
+                        </a:rPr>
+                        <a:t>2</a:t>
+                      </a:r>
+                    </a:p>
+                  </a:txBody>
+                  <a:tcPr marL="7620" marR="7620" marT="7620" marB="0" anchor="b">
+                    <a:lnL w="6350" cap="flat" cmpd="sng" algn="ctr">
+                      <a:solidFill>
+                        <a:srgbClr val="000000"/>
+                      </a:solidFill>
+                      <a:prstDash val="solid"/>
+                      <a:round/>
+                      <a:headEnd type="none" w="med" len="med"/>
+                      <a:tailEnd type="none" w="med" len="med"/>
+                    </a:lnL>
+                    <a:lnR w="6350" cap="flat" cmpd="sng" algn="ctr">
+                      <a:solidFill>
+                        <a:srgbClr val="000000"/>
+                      </a:solidFill>
+                      <a:prstDash val="solid"/>
+                      <a:round/>
+                      <a:headEnd type="none" w="med" len="med"/>
+                      <a:tailEnd type="none" w="med" len="med"/>
+                    </a:lnR>
+                    <a:lnT w="6350" cap="flat" cmpd="sng" algn="ctr">
+                      <a:solidFill>
+                        <a:srgbClr val="000000"/>
+                      </a:solidFill>
+                      <a:prstDash val="solid"/>
+                      <a:round/>
+                      <a:headEnd type="none" w="med" len="med"/>
+                      <a:tailEnd type="none" w="med" len="med"/>
+                    </a:lnT>
+                    <a:lnB w="6350" cap="flat" cmpd="sng" algn="ctr">
+                      <a:solidFill>
+                        <a:srgbClr val="000000"/>
+                      </a:solidFill>
+                      <a:prstDash val="solid"/>
+                      <a:round/>
+                      <a:headEnd type="none" w="med" len="med"/>
+                      <a:tailEnd type="none" w="med" len="med"/>
+                    </a:lnB>
+                    <a:solidFill>
+                      <a:schemeClr val="bg1"/>
+                    </a:solidFill>
+                  </a:tcPr>
+                </a:tc>
+                <a:tc>
+                  <a:txBody>
+                    <a:bodyPr/>
+                    <a:lstStyle/>
+                    <a:p>
+                      <a:pPr algn="r" fontAlgn="b"/>
+                      <a:r>
+                        <a:rPr lang="en-CA" sz="1100" b="0" i="0" u="none" strike="noStrike">
+                          <a:solidFill>
+                            <a:srgbClr val="000000"/>
+                          </a:solidFill>
+                          <a:effectLst/>
+                          <a:latin typeface="Aptos Narrow" panose="020B0004020202020204" pitchFamily="34" charset="0"/>
+                        </a:rPr>
+                        <a:t>119</a:t>
+                      </a:r>
+                    </a:p>
+                  </a:txBody>
+                  <a:tcPr marL="7620" marR="7620" marT="7620" marB="0" anchor="b">
+                    <a:lnL w="6350" cap="flat" cmpd="sng" algn="ctr">
+                      <a:solidFill>
+                        <a:srgbClr val="000000"/>
+                      </a:solidFill>
+                      <a:prstDash val="solid"/>
+                      <a:round/>
+                      <a:headEnd type="none" w="med" len="med"/>
+                      <a:tailEnd type="none" w="med" len="med"/>
+                    </a:lnL>
+                    <a:lnR w="6350" cap="flat" cmpd="sng" algn="ctr">
+                      <a:solidFill>
+                        <a:srgbClr val="000000"/>
+                      </a:solidFill>
+                      <a:prstDash val="solid"/>
+                      <a:round/>
+                      <a:headEnd type="none" w="med" len="med"/>
+                      <a:tailEnd type="none" w="med" len="med"/>
+                    </a:lnR>
+                    <a:lnT w="6350" cap="flat" cmpd="sng" algn="ctr">
+                      <a:solidFill>
+                        <a:srgbClr val="000000"/>
+                      </a:solidFill>
+                      <a:prstDash val="solid"/>
+                      <a:round/>
+                      <a:headEnd type="none" w="med" len="med"/>
+                      <a:tailEnd type="none" w="med" len="med"/>
+                    </a:lnT>
+                    <a:lnB w="6350" cap="flat" cmpd="sng" algn="ctr">
+                      <a:solidFill>
+                        <a:srgbClr val="000000"/>
+                      </a:solidFill>
+                      <a:prstDash val="solid"/>
+                      <a:round/>
+                      <a:headEnd type="none" w="med" len="med"/>
+                      <a:tailEnd type="none" w="med" len="med"/>
+                    </a:lnB>
+                    <a:solidFill>
+                      <a:schemeClr val="bg1"/>
+                    </a:solidFill>
+                  </a:tcPr>
+                </a:tc>
+                <a:tc>
+                  <a:txBody>
+                    <a:bodyPr/>
+                    <a:lstStyle/>
+                    <a:p>
+                      <a:pPr algn="r" fontAlgn="b"/>
+                      <a:r>
+                        <a:rPr lang="en-CA" sz="1100" b="0" i="0" u="none" strike="noStrike">
+                          <a:solidFill>
+                            <a:srgbClr val="000000"/>
+                          </a:solidFill>
+                          <a:effectLst/>
+                          <a:latin typeface="Aptos Narrow" panose="020B0004020202020204" pitchFamily="34" charset="0"/>
+                        </a:rPr>
+                        <a:t>771</a:t>
+                      </a:r>
+                    </a:p>
+                  </a:txBody>
+                  <a:tcPr marL="7620" marR="7620" marT="7620" marB="0" anchor="b">
+                    <a:lnL w="6350" cap="flat" cmpd="sng" algn="ctr">
+                      <a:solidFill>
+                        <a:srgbClr val="000000"/>
+                      </a:solidFill>
+                      <a:prstDash val="solid"/>
+                      <a:round/>
+                      <a:headEnd type="none" w="med" len="med"/>
+                      <a:tailEnd type="none" w="med" len="med"/>
+                    </a:lnL>
+                    <a:lnR w="6350" cap="flat" cmpd="sng" algn="ctr">
+                      <a:solidFill>
+                        <a:srgbClr val="000000"/>
+                      </a:solidFill>
+                      <a:prstDash val="solid"/>
+                      <a:round/>
+                      <a:headEnd type="none" w="med" len="med"/>
+                      <a:tailEnd type="none" w="med" len="med"/>
+                    </a:lnR>
+                    <a:lnT w="6350" cap="flat" cmpd="sng" algn="ctr">
+                      <a:solidFill>
+                        <a:srgbClr val="000000"/>
+                      </a:solidFill>
+                      <a:prstDash val="solid"/>
+                      <a:round/>
+                      <a:headEnd type="none" w="med" len="med"/>
+                      <a:tailEnd type="none" w="med" len="med"/>
+                    </a:lnT>
+                    <a:lnB w="6350" cap="flat" cmpd="sng" algn="ctr">
+                      <a:solidFill>
+                        <a:srgbClr val="000000"/>
+                      </a:solidFill>
+                      <a:prstDash val="solid"/>
+                      <a:round/>
+                      <a:headEnd type="none" w="med" len="med"/>
+                      <a:tailEnd type="none" w="med" len="med"/>
+                    </a:lnB>
+                    <a:solidFill>
+                      <a:schemeClr val="bg1"/>
+                    </a:solidFill>
+                  </a:tcPr>
+                </a:tc>
+                <a:extLst>
+                  <a:ext uri="{0D108BD9-81ED-4DB2-BD59-A6C34878D82A}">
+                    <a16:rowId xmlns:a16="http://schemas.microsoft.com/office/drawing/2014/main" val="3325346952"/>
+                  </a:ext>
+                </a:extLst>
+              </a:tr>
+              <a:tr h="182880">
+                <a:tc>
+                  <a:txBody>
+                    <a:bodyPr/>
+                    <a:lstStyle/>
+                    <a:p>
+                      <a:pPr algn="r" fontAlgn="b"/>
+                      <a:r>
+                        <a:rPr lang="en-CA" sz="1100" b="0" i="0" u="none" strike="noStrike" dirty="0">
+                          <a:solidFill>
+                            <a:srgbClr val="000000"/>
+                          </a:solidFill>
+                          <a:effectLst/>
+                          <a:highlight>
+                            <a:srgbClr val="FFFF00"/>
+                          </a:highlight>
+                          <a:latin typeface="Aptos Narrow" panose="020B0004020202020204" pitchFamily="34" charset="0"/>
+                        </a:rPr>
+                        <a:t>16</a:t>
+                      </a:r>
+                    </a:p>
+                  </a:txBody>
+                  <a:tcPr marL="7620" marR="7620" marT="7620" marB="0" anchor="b">
+                    <a:lnL w="6350" cap="flat" cmpd="sng" algn="ctr">
+                      <a:solidFill>
+                        <a:srgbClr val="000000"/>
+                      </a:solidFill>
+                      <a:prstDash val="solid"/>
+                      <a:round/>
+                      <a:headEnd type="none" w="med" len="med"/>
+                      <a:tailEnd type="none" w="med" len="med"/>
+                    </a:lnL>
+                    <a:lnR w="6350" cap="flat" cmpd="sng" algn="ctr">
+                      <a:solidFill>
+                        <a:srgbClr val="000000"/>
+                      </a:solidFill>
+                      <a:prstDash val="solid"/>
+                      <a:round/>
+                      <a:headEnd type="none" w="med" len="med"/>
+                      <a:tailEnd type="none" w="med" len="med"/>
+                    </a:lnR>
+                    <a:lnT w="6350" cap="flat" cmpd="sng" algn="ctr">
+                      <a:solidFill>
+                        <a:srgbClr val="000000"/>
+                      </a:solidFill>
+                      <a:prstDash val="solid"/>
+                      <a:round/>
+                      <a:headEnd type="none" w="med" len="med"/>
+                      <a:tailEnd type="none" w="med" len="med"/>
+                    </a:lnT>
+                    <a:lnB w="6350" cap="flat" cmpd="sng" algn="ctr">
+                      <a:solidFill>
+                        <a:srgbClr val="000000"/>
+                      </a:solidFill>
+                      <a:prstDash val="solid"/>
+                      <a:round/>
+                      <a:headEnd type="none" w="med" len="med"/>
+                      <a:tailEnd type="none" w="med" len="med"/>
+                    </a:lnB>
+                    <a:solidFill>
+                      <a:srgbClr val="FFFF00"/>
+                    </a:solidFill>
+                  </a:tcPr>
+                </a:tc>
+                <a:tc>
+                  <a:txBody>
+                    <a:bodyPr/>
+                    <a:lstStyle/>
+                    <a:p>
+                      <a:pPr algn="r" fontAlgn="b"/>
+                      <a:r>
+                        <a:rPr lang="en-CA" sz="1100" b="0" i="0" u="none" strike="noStrike" dirty="0">
+                          <a:solidFill>
+                            <a:srgbClr val="000000"/>
+                          </a:solidFill>
+                          <a:effectLst/>
+                          <a:highlight>
+                            <a:srgbClr val="FFFF00"/>
+                          </a:highlight>
+                          <a:latin typeface="Aptos Narrow" panose="020B0004020202020204" pitchFamily="34" charset="0"/>
+                        </a:rPr>
+                        <a:t>1</a:t>
+                      </a:r>
+                    </a:p>
+                  </a:txBody>
+                  <a:tcPr marL="7620" marR="7620" marT="7620" marB="0" anchor="b">
+                    <a:lnL w="6350" cap="flat" cmpd="sng" algn="ctr">
+                      <a:solidFill>
+                        <a:srgbClr val="000000"/>
+                      </a:solidFill>
+                      <a:prstDash val="solid"/>
+                      <a:round/>
+                      <a:headEnd type="none" w="med" len="med"/>
+                      <a:tailEnd type="none" w="med" len="med"/>
+                    </a:lnL>
+                    <a:lnR w="6350" cap="flat" cmpd="sng" algn="ctr">
+                      <a:solidFill>
+                        <a:srgbClr val="000000"/>
+                      </a:solidFill>
+                      <a:prstDash val="solid"/>
+                      <a:round/>
+                      <a:headEnd type="none" w="med" len="med"/>
+                      <a:tailEnd type="none" w="med" len="med"/>
+                    </a:lnR>
+                    <a:lnT w="6350" cap="flat" cmpd="sng" algn="ctr">
+                      <a:solidFill>
+                        <a:srgbClr val="000000"/>
+                      </a:solidFill>
+                      <a:prstDash val="solid"/>
+                      <a:round/>
+                      <a:headEnd type="none" w="med" len="med"/>
+                      <a:tailEnd type="none" w="med" len="med"/>
+                    </a:lnT>
+                    <a:lnB w="6350" cap="flat" cmpd="sng" algn="ctr">
+                      <a:solidFill>
+                        <a:srgbClr val="000000"/>
+                      </a:solidFill>
+                      <a:prstDash val="solid"/>
+                      <a:round/>
+                      <a:headEnd type="none" w="med" len="med"/>
+                      <a:tailEnd type="none" w="med" len="med"/>
+                    </a:lnB>
+                    <a:solidFill>
+                      <a:srgbClr val="FFFF00"/>
+                    </a:solidFill>
+                  </a:tcPr>
+                </a:tc>
+                <a:tc>
+                  <a:txBody>
+                    <a:bodyPr/>
+                    <a:lstStyle/>
+                    <a:p>
+                      <a:pPr algn="r" fontAlgn="b"/>
+                      <a:r>
+                        <a:rPr lang="en-CA" sz="1100" b="0" i="0" u="none" strike="noStrike" dirty="0">
+                          <a:solidFill>
+                            <a:srgbClr val="000000"/>
+                          </a:solidFill>
+                          <a:effectLst/>
+                          <a:highlight>
+                            <a:srgbClr val="FFFF00"/>
+                          </a:highlight>
+                          <a:latin typeface="Aptos Narrow" panose="020B0004020202020204" pitchFamily="34" charset="0"/>
+                        </a:rPr>
+                        <a:t>242</a:t>
+                      </a:r>
+                    </a:p>
+                  </a:txBody>
+                  <a:tcPr marL="7620" marR="7620" marT="7620" marB="0" anchor="b">
+                    <a:lnL w="6350" cap="flat" cmpd="sng" algn="ctr">
+                      <a:solidFill>
+                        <a:srgbClr val="000000"/>
+                      </a:solidFill>
+                      <a:prstDash val="solid"/>
+                      <a:round/>
+                      <a:headEnd type="none" w="med" len="med"/>
+                      <a:tailEnd type="none" w="med" len="med"/>
+                    </a:lnL>
+                    <a:lnR w="6350" cap="flat" cmpd="sng" algn="ctr">
+                      <a:solidFill>
+                        <a:srgbClr val="000000"/>
+                      </a:solidFill>
+                      <a:prstDash val="solid"/>
+                      <a:round/>
+                      <a:headEnd type="none" w="med" len="med"/>
+                      <a:tailEnd type="none" w="med" len="med"/>
+                    </a:lnR>
+                    <a:lnT w="6350" cap="flat" cmpd="sng" algn="ctr">
+                      <a:solidFill>
+                        <a:srgbClr val="000000"/>
+                      </a:solidFill>
+                      <a:prstDash val="solid"/>
+                      <a:round/>
+                      <a:headEnd type="none" w="med" len="med"/>
+                      <a:tailEnd type="none" w="med" len="med"/>
+                    </a:lnT>
+                    <a:lnB w="6350" cap="flat" cmpd="sng" algn="ctr">
+                      <a:solidFill>
+                        <a:srgbClr val="000000"/>
+                      </a:solidFill>
+                      <a:prstDash val="solid"/>
+                      <a:round/>
+                      <a:headEnd type="none" w="med" len="med"/>
+                      <a:tailEnd type="none" w="med" len="med"/>
+                    </a:lnB>
+                    <a:solidFill>
+                      <a:srgbClr val="FFFF00"/>
+                    </a:solidFill>
+                  </a:tcPr>
+                </a:tc>
+                <a:tc>
+                  <a:txBody>
+                    <a:bodyPr/>
+                    <a:lstStyle/>
+                    <a:p>
+                      <a:pPr algn="r" fontAlgn="b"/>
+                      <a:r>
+                        <a:rPr lang="en-CA" sz="1100" b="0" i="0" u="none" strike="noStrike" dirty="0">
+                          <a:solidFill>
+                            <a:srgbClr val="000000"/>
+                          </a:solidFill>
+                          <a:effectLst/>
+                          <a:highlight>
+                            <a:srgbClr val="FFFF00"/>
+                          </a:highlight>
+                          <a:latin typeface="Aptos Narrow" panose="020B0004020202020204" pitchFamily="34" charset="0"/>
+                        </a:rPr>
+                        <a:t>655</a:t>
+                      </a:r>
+                    </a:p>
+                  </a:txBody>
+                  <a:tcPr marL="7620" marR="7620" marT="7620" marB="0" anchor="b">
+                    <a:lnL w="6350" cap="flat" cmpd="sng" algn="ctr">
+                      <a:solidFill>
+                        <a:srgbClr val="000000"/>
+                      </a:solidFill>
+                      <a:prstDash val="solid"/>
+                      <a:round/>
+                      <a:headEnd type="none" w="med" len="med"/>
+                      <a:tailEnd type="none" w="med" len="med"/>
+                    </a:lnL>
+                    <a:lnR w="6350" cap="flat" cmpd="sng" algn="ctr">
+                      <a:solidFill>
+                        <a:srgbClr val="000000"/>
+                      </a:solidFill>
+                      <a:prstDash val="solid"/>
+                      <a:round/>
+                      <a:headEnd type="none" w="med" len="med"/>
+                      <a:tailEnd type="none" w="med" len="med"/>
+                    </a:lnR>
+                    <a:lnT w="6350" cap="flat" cmpd="sng" algn="ctr">
+                      <a:solidFill>
+                        <a:srgbClr val="000000"/>
+                      </a:solidFill>
+                      <a:prstDash val="solid"/>
+                      <a:round/>
+                      <a:headEnd type="none" w="med" len="med"/>
+                      <a:tailEnd type="none" w="med" len="med"/>
+                    </a:lnT>
+                    <a:lnB w="6350" cap="flat" cmpd="sng" algn="ctr">
+                      <a:solidFill>
+                        <a:srgbClr val="000000"/>
+                      </a:solidFill>
+                      <a:prstDash val="solid"/>
+                      <a:round/>
+                      <a:headEnd type="none" w="med" len="med"/>
+                      <a:tailEnd type="none" w="med" len="med"/>
+                    </a:lnB>
+                    <a:solidFill>
+                      <a:srgbClr val="FFFF00"/>
+                    </a:solidFill>
+                  </a:tcPr>
+                </a:tc>
+                <a:extLst>
+                  <a:ext uri="{0D108BD9-81ED-4DB2-BD59-A6C34878D82A}">
+                    <a16:rowId xmlns:a16="http://schemas.microsoft.com/office/drawing/2014/main" val="1364475588"/>
+                  </a:ext>
+                </a:extLst>
+              </a:tr>
+              <a:tr h="182880">
+                <a:tc>
+                  <a:txBody>
+                    <a:bodyPr/>
+                    <a:lstStyle/>
+                    <a:p>
+                      <a:pPr algn="r" fontAlgn="b"/>
+                      <a:r>
+                        <a:rPr lang="en-CA" sz="1100" b="0" i="0" u="none" strike="noStrike">
+                          <a:solidFill>
+                            <a:srgbClr val="000000"/>
+                          </a:solidFill>
+                          <a:effectLst/>
+                          <a:latin typeface="Aptos Narrow" panose="020B0004020202020204" pitchFamily="34" charset="0"/>
+                        </a:rPr>
+                        <a:t>24</a:t>
+                      </a:r>
+                    </a:p>
+                  </a:txBody>
+                  <a:tcPr marL="7620" marR="7620" marT="7620" marB="0" anchor="b">
+                    <a:lnL w="6350" cap="flat" cmpd="sng" algn="ctr">
+                      <a:solidFill>
+                        <a:srgbClr val="000000"/>
+                      </a:solidFill>
+                      <a:prstDash val="solid"/>
+                      <a:round/>
+                      <a:headEnd type="none" w="med" len="med"/>
+                      <a:tailEnd type="none" w="med" len="med"/>
+                    </a:lnL>
+                    <a:lnR w="6350" cap="flat" cmpd="sng" algn="ctr">
+                      <a:solidFill>
+                        <a:srgbClr val="000000"/>
+                      </a:solidFill>
+                      <a:prstDash val="solid"/>
+                      <a:round/>
+                      <a:headEnd type="none" w="med" len="med"/>
+                      <a:tailEnd type="none" w="med" len="med"/>
+                    </a:lnR>
+                    <a:lnT w="6350" cap="flat" cmpd="sng" algn="ctr">
+                      <a:solidFill>
+                        <a:srgbClr val="000000"/>
+                      </a:solidFill>
+                      <a:prstDash val="solid"/>
+                      <a:round/>
+                      <a:headEnd type="none" w="med" len="med"/>
+                      <a:tailEnd type="none" w="med" len="med"/>
+                    </a:lnT>
+                    <a:lnB w="6350" cap="flat" cmpd="sng" algn="ctr">
+                      <a:solidFill>
+                        <a:srgbClr val="000000"/>
+                      </a:solidFill>
+                      <a:prstDash val="solid"/>
+                      <a:round/>
+                      <a:headEnd type="none" w="med" len="med"/>
+                      <a:tailEnd type="none" w="med" len="med"/>
+                    </a:lnB>
+                    <a:solidFill>
+                      <a:schemeClr val="bg1"/>
+                    </a:solidFill>
+                  </a:tcPr>
+                </a:tc>
+                <a:tc>
+                  <a:txBody>
+                    <a:bodyPr/>
+                    <a:lstStyle/>
+                    <a:p>
+                      <a:pPr algn="r" fontAlgn="b"/>
+                      <a:r>
+                        <a:rPr lang="en-CA" sz="1100" b="0" i="0" u="none" strike="noStrike">
+                          <a:solidFill>
+                            <a:srgbClr val="000000"/>
+                          </a:solidFill>
+                          <a:effectLst/>
+                          <a:latin typeface="Aptos Narrow" panose="020B0004020202020204" pitchFamily="34" charset="0"/>
+                        </a:rPr>
+                        <a:t>1</a:t>
+                      </a:r>
+                    </a:p>
+                  </a:txBody>
+                  <a:tcPr marL="7620" marR="7620" marT="7620" marB="0" anchor="b">
+                    <a:lnL w="6350" cap="flat" cmpd="sng" algn="ctr">
+                      <a:solidFill>
+                        <a:srgbClr val="000000"/>
+                      </a:solidFill>
+                      <a:prstDash val="solid"/>
+                      <a:round/>
+                      <a:headEnd type="none" w="med" len="med"/>
+                      <a:tailEnd type="none" w="med" len="med"/>
+                    </a:lnL>
+                    <a:lnR w="6350" cap="flat" cmpd="sng" algn="ctr">
+                      <a:solidFill>
+                        <a:srgbClr val="000000"/>
+                      </a:solidFill>
+                      <a:prstDash val="solid"/>
+                      <a:round/>
+                      <a:headEnd type="none" w="med" len="med"/>
+                      <a:tailEnd type="none" w="med" len="med"/>
+                    </a:lnR>
+                    <a:lnT w="6350" cap="flat" cmpd="sng" algn="ctr">
+                      <a:solidFill>
+                        <a:srgbClr val="000000"/>
+                      </a:solidFill>
+                      <a:prstDash val="solid"/>
+                      <a:round/>
+                      <a:headEnd type="none" w="med" len="med"/>
+                      <a:tailEnd type="none" w="med" len="med"/>
+                    </a:lnT>
+                    <a:lnB w="6350" cap="flat" cmpd="sng" algn="ctr">
+                      <a:solidFill>
+                        <a:srgbClr val="000000"/>
+                      </a:solidFill>
+                      <a:prstDash val="solid"/>
+                      <a:round/>
+                      <a:headEnd type="none" w="med" len="med"/>
+                      <a:tailEnd type="none" w="med" len="med"/>
+                    </a:lnB>
+                    <a:solidFill>
+                      <a:schemeClr val="bg1"/>
+                    </a:solidFill>
+                  </a:tcPr>
+                </a:tc>
+                <a:tc>
+                  <a:txBody>
+                    <a:bodyPr/>
+                    <a:lstStyle/>
+                    <a:p>
+                      <a:pPr algn="r" fontAlgn="b"/>
+                      <a:r>
+                        <a:rPr lang="en-CA" sz="1100" b="0" i="0" u="none" strike="noStrike">
+                          <a:solidFill>
+                            <a:srgbClr val="000000"/>
+                          </a:solidFill>
+                          <a:effectLst/>
+                          <a:latin typeface="Aptos Narrow" panose="020B0004020202020204" pitchFamily="34" charset="0"/>
+                        </a:rPr>
+                        <a:t>264</a:t>
+                      </a:r>
+                    </a:p>
+                  </a:txBody>
+                  <a:tcPr marL="7620" marR="7620" marT="7620" marB="0" anchor="b">
+                    <a:lnL w="6350" cap="flat" cmpd="sng" algn="ctr">
+                      <a:solidFill>
+                        <a:srgbClr val="000000"/>
+                      </a:solidFill>
+                      <a:prstDash val="solid"/>
+                      <a:round/>
+                      <a:headEnd type="none" w="med" len="med"/>
+                      <a:tailEnd type="none" w="med" len="med"/>
+                    </a:lnL>
+                    <a:lnR w="6350" cap="flat" cmpd="sng" algn="ctr">
+                      <a:solidFill>
+                        <a:srgbClr val="000000"/>
+                      </a:solidFill>
+                      <a:prstDash val="solid"/>
+                      <a:round/>
+                      <a:headEnd type="none" w="med" len="med"/>
+                      <a:tailEnd type="none" w="med" len="med"/>
+                    </a:lnR>
+                    <a:lnT w="6350" cap="flat" cmpd="sng" algn="ctr">
+                      <a:solidFill>
+                        <a:srgbClr val="000000"/>
+                      </a:solidFill>
+                      <a:prstDash val="solid"/>
+                      <a:round/>
+                      <a:headEnd type="none" w="med" len="med"/>
+                      <a:tailEnd type="none" w="med" len="med"/>
+                    </a:lnT>
+                    <a:lnB w="6350" cap="flat" cmpd="sng" algn="ctr">
+                      <a:solidFill>
+                        <a:srgbClr val="000000"/>
+                      </a:solidFill>
+                      <a:prstDash val="solid"/>
+                      <a:round/>
+                      <a:headEnd type="none" w="med" len="med"/>
+                      <a:tailEnd type="none" w="med" len="med"/>
+                    </a:lnB>
+                    <a:solidFill>
+                      <a:schemeClr val="bg1"/>
+                    </a:solidFill>
+                  </a:tcPr>
+                </a:tc>
+                <a:tc>
+                  <a:txBody>
+                    <a:bodyPr/>
+                    <a:lstStyle/>
+                    <a:p>
+                      <a:pPr algn="r" fontAlgn="b"/>
+                      <a:r>
+                        <a:rPr lang="en-CA" sz="1100" b="0" i="0" u="none" strike="noStrike" dirty="0">
+                          <a:solidFill>
+                            <a:srgbClr val="000000"/>
+                          </a:solidFill>
+                          <a:effectLst/>
+                          <a:latin typeface="Aptos Narrow" panose="020B0004020202020204" pitchFamily="34" charset="0"/>
+                        </a:rPr>
+                        <a:t>715</a:t>
+                      </a:r>
+                    </a:p>
+                  </a:txBody>
+                  <a:tcPr marL="7620" marR="7620" marT="7620" marB="0" anchor="b">
+                    <a:lnL w="6350" cap="flat" cmpd="sng" algn="ctr">
+                      <a:solidFill>
+                        <a:srgbClr val="000000"/>
+                      </a:solidFill>
+                      <a:prstDash val="solid"/>
+                      <a:round/>
+                      <a:headEnd type="none" w="med" len="med"/>
+                      <a:tailEnd type="none" w="med" len="med"/>
+                    </a:lnL>
+                    <a:lnR w="6350" cap="flat" cmpd="sng" algn="ctr">
+                      <a:solidFill>
+                        <a:srgbClr val="000000"/>
+                      </a:solidFill>
+                      <a:prstDash val="solid"/>
+                      <a:round/>
+                      <a:headEnd type="none" w="med" len="med"/>
+                      <a:tailEnd type="none" w="med" len="med"/>
+                    </a:lnR>
+                    <a:lnT w="6350" cap="flat" cmpd="sng" algn="ctr">
+                      <a:solidFill>
+                        <a:srgbClr val="000000"/>
+                      </a:solidFill>
+                      <a:prstDash val="solid"/>
+                      <a:round/>
+                      <a:headEnd type="none" w="med" len="med"/>
+                      <a:tailEnd type="none" w="med" len="med"/>
+                    </a:lnT>
+                    <a:lnB w="6350" cap="flat" cmpd="sng" algn="ctr">
+                      <a:solidFill>
+                        <a:srgbClr val="000000"/>
+                      </a:solidFill>
+                      <a:prstDash val="solid"/>
+                      <a:round/>
+                      <a:headEnd type="none" w="med" len="med"/>
+                      <a:tailEnd type="none" w="med" len="med"/>
+                    </a:lnB>
+                    <a:solidFill>
+                      <a:schemeClr val="bg1"/>
+                    </a:solidFill>
+                  </a:tcPr>
+                </a:tc>
+                <a:extLst>
+                  <a:ext uri="{0D108BD9-81ED-4DB2-BD59-A6C34878D82A}">
+                    <a16:rowId xmlns:a16="http://schemas.microsoft.com/office/drawing/2014/main" val="1387001118"/>
+                  </a:ext>
+                </a:extLst>
+              </a:tr>
+            </a:tbl>
+          </a:graphicData>
+        </a:graphic>
+      </p:graphicFrame>
+    </p:spTree>
+    <p:extLst>
+      <p:ext uri="{BB962C8B-B14F-4D97-AF65-F5344CB8AC3E}">
+        <p14:creationId xmlns:p14="http://schemas.microsoft.com/office/powerpoint/2010/main" val="3422962183"/>
+      </p:ext>
+    </p:extLst>
+  </p:cSld>
+  <p:clrMapOvr>
+    <a:masterClrMapping/>
+  </p:clrMapOvr>
+</p:sld>
+</file>
+
+<file path=ppt/slides/slide13.xml><?xml version="1.0" encoding="utf-8"?>
+<p:sld xmlns:a="http://schemas.openxmlformats.org/drawingml/2006/main" xmlns:r="http://schemas.openxmlformats.org/officeDocument/2006/relationships" xmlns:p="http://schemas.openxmlformats.org/presentationml/2006/main">
+  <p:cSld>
+    <p:spTree>
+      <p:nvGrpSpPr>
+        <p:cNvPr id="1" name=""/>
+        <p:cNvGrpSpPr/>
+        <p:nvPr/>
+      </p:nvGrpSpPr>
+      <p:grpSpPr>
+        <a:xfrm>
+          <a:off x="0" y="0"/>
+          <a:ext cx="0" cy="0"/>
+          <a:chOff x="0" y="0"/>
+          <a:chExt cx="0" cy="0"/>
+        </a:xfrm>
+      </p:grpSpPr>
+      <p:sp>
+        <p:nvSpPr>
+          <p:cNvPr id="2" name="Title 1">
+            <a:extLst>
+              <a:ext uri="{FF2B5EF4-FFF2-40B4-BE49-F238E27FC236}">
+                <a16:creationId xmlns:a16="http://schemas.microsoft.com/office/drawing/2014/main" id="{BF945539-0D31-B493-97C1-19BC9CBC0DE2}"/>
+              </a:ext>
+            </a:extLst>
+          </p:cNvPr>
+          <p:cNvSpPr>
+            <a:spLocks noGrp="1"/>
+          </p:cNvSpPr>
+          <p:nvPr>
+            <p:ph type="title"/>
+          </p:nvPr>
+        </p:nvSpPr>
+        <p:spPr>
+          <a:xfrm>
+            <a:off x="152400" y="352373"/>
+            <a:ext cx="10515600" cy="1325563"/>
+          </a:xfrm>
+        </p:spPr>
+        <p:txBody>
+          <a:bodyPr/>
+          <a:lstStyle/>
+          <a:p>
+            <a:r>
+              <a:rPr lang="en-CA" b="1" dirty="0">
+                <a:solidFill>
+                  <a:schemeClr val="bg1"/>
+                </a:solidFill>
+              </a:rPr>
+              <a:t>Linear, Random Forest, and XG Boost- iterations</a:t>
+            </a:r>
+          </a:p>
+        </p:txBody>
+      </p:sp>
+      <p:graphicFrame>
+        <p:nvGraphicFramePr>
+          <p:cNvPr id="5" name="Table 4">
+            <a:extLst>
+              <a:ext uri="{FF2B5EF4-FFF2-40B4-BE49-F238E27FC236}">
+                <a16:creationId xmlns:a16="http://schemas.microsoft.com/office/drawing/2014/main" id="{5D48654F-C530-A873-85A2-7C4C63BF8D6A}"/>
+              </a:ext>
+            </a:extLst>
+          </p:cNvPr>
+          <p:cNvGraphicFramePr>
+            <a:graphicFrameLocks noGrp="1"/>
+          </p:cNvGraphicFramePr>
+          <p:nvPr>
+            <p:extLst>
+              <p:ext uri="{D42A27DB-BD31-4B8C-83A1-F6EECF244321}">
+                <p14:modId xmlns:p14="http://schemas.microsoft.com/office/powerpoint/2010/main" val="2149531074"/>
+              </p:ext>
+            </p:extLst>
+          </p:nvPr>
+        </p:nvGraphicFramePr>
+        <p:xfrm>
+          <a:off x="6318250" y="2369820"/>
+          <a:ext cx="3924300" cy="1059180"/>
+        </p:xfrm>
+        <a:graphic>
+          <a:graphicData uri="http://schemas.openxmlformats.org/drawingml/2006/table">
+            <a:tbl>
+              <a:tblPr/>
+              <a:tblGrid>
+                <a:gridCol w="1232842">
+                  <a:extLst>
+                    <a:ext uri="{9D8B030D-6E8A-4147-A177-3AD203B41FA5}">
+                      <a16:colId xmlns:a16="http://schemas.microsoft.com/office/drawing/2014/main" val="3721764901"/>
+                    </a:ext>
+                  </a:extLst>
+                </a:gridCol>
+                <a:gridCol w="1345729">
+                  <a:extLst>
+                    <a:ext uri="{9D8B030D-6E8A-4147-A177-3AD203B41FA5}">
+                      <a16:colId xmlns:a16="http://schemas.microsoft.com/office/drawing/2014/main" val="3954421170"/>
+                    </a:ext>
+                  </a:extLst>
+                </a:gridCol>
+                <a:gridCol w="1345729">
+                  <a:extLst>
+                    <a:ext uri="{9D8B030D-6E8A-4147-A177-3AD203B41FA5}">
+                      <a16:colId xmlns:a16="http://schemas.microsoft.com/office/drawing/2014/main" val="2939086856"/>
+                    </a:ext>
+                  </a:extLst>
+                </a:gridCol>
+              </a:tblGrid>
+              <a:tr h="228600">
+                <a:tc>
+                  <a:txBody>
+                    <a:bodyPr/>
+                    <a:lstStyle/>
+                    <a:p>
+                      <a:pPr algn="l" fontAlgn="b"/>
+                      <a:r>
+                        <a:rPr lang="en-CA" sz="1100" b="0" i="0" u="none" strike="noStrike">
+                          <a:solidFill>
+                            <a:srgbClr val="000000"/>
+                          </a:solidFill>
+                          <a:effectLst/>
+                          <a:latin typeface="Aptos Narrow" panose="020B0004020202020204" pitchFamily="34" charset="0"/>
+                        </a:rPr>
+                        <a:t> </a:t>
+                      </a:r>
+                    </a:p>
+                  </a:txBody>
+                  <a:tcPr marL="7620" marR="7620" marT="7620" marB="0" anchor="b">
+                    <a:lnL w="6350" cap="flat" cmpd="sng" algn="ctr">
+                      <a:solidFill>
+                        <a:srgbClr val="000000"/>
+                      </a:solidFill>
+                      <a:prstDash val="solid"/>
+                      <a:round/>
+                      <a:headEnd type="none" w="med" len="med"/>
+                      <a:tailEnd type="none" w="med" len="med"/>
+                    </a:lnL>
+                    <a:lnR w="6350" cap="flat" cmpd="sng" algn="ctr">
+                      <a:solidFill>
+                        <a:srgbClr val="000000"/>
+                      </a:solidFill>
+                      <a:prstDash val="solid"/>
+                      <a:round/>
+                      <a:headEnd type="none" w="med" len="med"/>
+                      <a:tailEnd type="none" w="med" len="med"/>
+                    </a:lnR>
+                    <a:lnT w="6350" cap="flat" cmpd="sng" algn="ctr">
+                      <a:solidFill>
+                        <a:srgbClr val="000000"/>
+                      </a:solidFill>
+                      <a:prstDash val="solid"/>
+                      <a:round/>
+                      <a:headEnd type="none" w="med" len="med"/>
+                      <a:tailEnd type="none" w="med" len="med"/>
+                    </a:lnT>
+                    <a:lnB w="6350" cap="flat" cmpd="sng" algn="ctr">
+                      <a:solidFill>
+                        <a:srgbClr val="000000"/>
+                      </a:solidFill>
+                      <a:prstDash val="solid"/>
+                      <a:round/>
+                      <a:headEnd type="none" w="med" len="med"/>
+                      <a:tailEnd type="none" w="med" len="med"/>
+                    </a:lnB>
+                    <a:solidFill>
+                      <a:schemeClr val="bg1"/>
+                    </a:solidFill>
+                  </a:tcPr>
+                </a:tc>
+                <a:tc gridSpan="2">
+                  <a:txBody>
+                    <a:bodyPr/>
+                    <a:lstStyle/>
+                    <a:p>
+                      <a:pPr algn="ctr" fontAlgn="b"/>
+                      <a:r>
+                        <a:rPr lang="en-CA" sz="1100" b="1" i="0" u="none" strike="noStrike" dirty="0">
+                          <a:solidFill>
+                            <a:srgbClr val="000000"/>
+                          </a:solidFill>
+                          <a:effectLst/>
+                          <a:latin typeface="Aptos Narrow" panose="020B0004020202020204" pitchFamily="34" charset="0"/>
+                        </a:rPr>
+                        <a:t>R2 Scores</a:t>
+                      </a:r>
+                    </a:p>
+                  </a:txBody>
+                  <a:tcPr marL="7620" marR="7620" marT="7620" marB="0" anchor="b">
+                    <a:lnL w="6350" cap="flat" cmpd="sng" algn="ctr">
+                      <a:solidFill>
+                        <a:srgbClr val="000000"/>
+                      </a:solidFill>
+                      <a:prstDash val="solid"/>
+                      <a:round/>
+                      <a:headEnd type="none" w="med" len="med"/>
+                      <a:tailEnd type="none" w="med" len="med"/>
+                    </a:lnL>
+                    <a:lnR w="6350" cap="flat" cmpd="sng" algn="ctr">
+                      <a:solidFill>
+                        <a:srgbClr val="000000"/>
+                      </a:solidFill>
+                      <a:prstDash val="solid"/>
+                      <a:round/>
+                      <a:headEnd type="none" w="med" len="med"/>
+                      <a:tailEnd type="none" w="med" len="med"/>
+                    </a:lnR>
+                    <a:lnT w="6350" cap="flat" cmpd="sng" algn="ctr">
+                      <a:solidFill>
+                        <a:srgbClr val="000000"/>
+                      </a:solidFill>
+                      <a:prstDash val="solid"/>
+                      <a:round/>
+                      <a:headEnd type="none" w="med" len="med"/>
+                      <a:tailEnd type="none" w="med" len="med"/>
+                    </a:lnT>
+                    <a:lnB w="6350" cap="flat" cmpd="sng" algn="ctr">
+                      <a:solidFill>
+                        <a:srgbClr val="000000"/>
+                      </a:solidFill>
+                      <a:prstDash val="solid"/>
+                      <a:round/>
+                      <a:headEnd type="none" w="med" len="med"/>
+                      <a:tailEnd type="none" w="med" len="med"/>
+                    </a:lnB>
+                    <a:solidFill>
+                      <a:schemeClr val="bg1"/>
+                    </a:solidFill>
+                  </a:tcPr>
+                </a:tc>
+                <a:tc hMerge="1">
+                  <a:txBody>
+                    <a:bodyPr/>
+                    <a:lstStyle/>
+                    <a:p>
+                      <a:endParaRPr lang="en-CA"/>
+                    </a:p>
+                  </a:txBody>
+                  <a:tcPr/>
+                </a:tc>
+                <a:extLst>
+                  <a:ext uri="{0D108BD9-81ED-4DB2-BD59-A6C34878D82A}">
+                    <a16:rowId xmlns:a16="http://schemas.microsoft.com/office/drawing/2014/main" val="1632934978"/>
+                  </a:ext>
+                </a:extLst>
+              </a:tr>
+              <a:tr h="228600">
+                <a:tc>
+                  <a:txBody>
+                    <a:bodyPr/>
+                    <a:lstStyle/>
+                    <a:p>
+                      <a:pPr algn="l" fontAlgn="b"/>
+                      <a:r>
+                        <a:rPr lang="en-CA" sz="1100" b="0" i="0" u="none" strike="noStrike" dirty="0">
+                          <a:solidFill>
+                            <a:srgbClr val="000000"/>
+                          </a:solidFill>
+                          <a:effectLst/>
+                          <a:latin typeface="Aptos Narrow" panose="020B0004020202020204" pitchFamily="34" charset="0"/>
+                        </a:rPr>
+                        <a:t> </a:t>
+                      </a:r>
+                    </a:p>
+                  </a:txBody>
+                  <a:tcPr marL="7620" marR="7620" marT="7620" marB="0" anchor="b">
+                    <a:lnL w="6350" cap="flat" cmpd="sng" algn="ctr">
+                      <a:solidFill>
+                        <a:srgbClr val="000000"/>
+                      </a:solidFill>
+                      <a:prstDash val="solid"/>
+                      <a:round/>
+                      <a:headEnd type="none" w="med" len="med"/>
+                      <a:tailEnd type="none" w="med" len="med"/>
+                    </a:lnL>
+                    <a:lnR w="6350" cap="flat" cmpd="sng" algn="ctr">
+                      <a:solidFill>
+                        <a:srgbClr val="000000"/>
+                      </a:solidFill>
+                      <a:prstDash val="solid"/>
+                      <a:round/>
+                      <a:headEnd type="none" w="med" len="med"/>
+                      <a:tailEnd type="none" w="med" len="med"/>
+                    </a:lnR>
+                    <a:lnT w="6350" cap="flat" cmpd="sng" algn="ctr">
+                      <a:solidFill>
+                        <a:srgbClr val="000000"/>
+                      </a:solidFill>
+                      <a:prstDash val="solid"/>
+                      <a:round/>
+                      <a:headEnd type="none" w="med" len="med"/>
+                      <a:tailEnd type="none" w="med" len="med"/>
+                    </a:lnT>
+                    <a:lnB w="6350" cap="flat" cmpd="sng" algn="ctr">
+                      <a:solidFill>
+                        <a:srgbClr val="000000"/>
+                      </a:solidFill>
+                      <a:prstDash val="solid"/>
+                      <a:round/>
+                      <a:headEnd type="none" w="med" len="med"/>
+                      <a:tailEnd type="none" w="med" len="med"/>
+                    </a:lnB>
+                    <a:solidFill>
+                      <a:schemeClr val="bg1"/>
+                    </a:solidFill>
+                  </a:tcPr>
+                </a:tc>
+                <a:tc>
+                  <a:txBody>
+                    <a:bodyPr/>
+                    <a:lstStyle/>
+                    <a:p>
+                      <a:pPr algn="l" fontAlgn="b"/>
+                      <a:r>
+                        <a:rPr lang="en-CA" sz="1100" b="1" i="0" u="none" strike="noStrike">
+                          <a:solidFill>
+                            <a:srgbClr val="000000"/>
+                          </a:solidFill>
+                          <a:effectLst/>
+                          <a:latin typeface="Aptos Narrow" panose="020B0004020202020204" pitchFamily="34" charset="0"/>
+                        </a:rPr>
+                        <a:t>12-Week Predict</a:t>
+                      </a:r>
+                    </a:p>
+                  </a:txBody>
+                  <a:tcPr marL="7620" marR="7620" marT="7620" marB="0" anchor="b">
+                    <a:lnL w="6350" cap="flat" cmpd="sng" algn="ctr">
+                      <a:solidFill>
+                        <a:srgbClr val="000000"/>
+                      </a:solidFill>
+                      <a:prstDash val="solid"/>
+                      <a:round/>
+                      <a:headEnd type="none" w="med" len="med"/>
+                      <a:tailEnd type="none" w="med" len="med"/>
+                    </a:lnL>
+                    <a:lnR w="6350" cap="flat" cmpd="sng" algn="ctr">
+                      <a:solidFill>
+                        <a:srgbClr val="000000"/>
+                      </a:solidFill>
+                      <a:prstDash val="solid"/>
+                      <a:round/>
+                      <a:headEnd type="none" w="med" len="med"/>
+                      <a:tailEnd type="none" w="med" len="med"/>
+                    </a:lnR>
+                    <a:lnT w="6350" cap="flat" cmpd="sng" algn="ctr">
+                      <a:solidFill>
+                        <a:srgbClr val="000000"/>
+                      </a:solidFill>
+                      <a:prstDash val="solid"/>
+                      <a:round/>
+                      <a:headEnd type="none" w="med" len="med"/>
+                      <a:tailEnd type="none" w="med" len="med"/>
+                    </a:lnT>
+                    <a:lnB w="6350" cap="flat" cmpd="sng" algn="ctr">
+                      <a:solidFill>
+                        <a:srgbClr val="000000"/>
+                      </a:solidFill>
+                      <a:prstDash val="solid"/>
+                      <a:round/>
+                      <a:headEnd type="none" w="med" len="med"/>
+                      <a:tailEnd type="none" w="med" len="med"/>
+                    </a:lnB>
+                    <a:solidFill>
+                      <a:schemeClr val="bg1"/>
+                    </a:solidFill>
+                  </a:tcPr>
+                </a:tc>
+                <a:tc>
+                  <a:txBody>
+                    <a:bodyPr/>
+                    <a:lstStyle/>
+                    <a:p>
+                      <a:pPr algn="l" fontAlgn="b"/>
+                      <a:r>
+                        <a:rPr lang="en-CA" sz="1100" b="1" i="0" u="none" strike="noStrike" dirty="0">
+                          <a:solidFill>
+                            <a:srgbClr val="000000"/>
+                          </a:solidFill>
+                          <a:effectLst/>
+                          <a:highlight>
+                            <a:srgbClr val="FFFF00"/>
+                          </a:highlight>
+                          <a:latin typeface="Aptos Narrow" panose="020B0004020202020204" pitchFamily="34" charset="0"/>
+                        </a:rPr>
+                        <a:t>16-Week Prediction</a:t>
+                      </a:r>
+                    </a:p>
+                  </a:txBody>
+                  <a:tcPr marL="7620" marR="7620" marT="7620" marB="0" anchor="b">
+                    <a:lnL w="6350" cap="flat" cmpd="sng" algn="ctr">
+                      <a:solidFill>
+                        <a:srgbClr val="000000"/>
+                      </a:solidFill>
+                      <a:prstDash val="solid"/>
+                      <a:round/>
+                      <a:headEnd type="none" w="med" len="med"/>
+                      <a:tailEnd type="none" w="med" len="med"/>
+                    </a:lnL>
+                    <a:lnR w="6350" cap="flat" cmpd="sng" algn="ctr">
+                      <a:solidFill>
+                        <a:srgbClr val="000000"/>
+                      </a:solidFill>
+                      <a:prstDash val="solid"/>
+                      <a:round/>
+                      <a:headEnd type="none" w="med" len="med"/>
+                      <a:tailEnd type="none" w="med" len="med"/>
+                    </a:lnR>
+                    <a:lnT w="6350" cap="flat" cmpd="sng" algn="ctr">
+                      <a:solidFill>
+                        <a:srgbClr val="000000"/>
+                      </a:solidFill>
+                      <a:prstDash val="solid"/>
+                      <a:round/>
+                      <a:headEnd type="none" w="med" len="med"/>
+                      <a:tailEnd type="none" w="med" len="med"/>
+                    </a:lnT>
+                    <a:lnB w="6350" cap="flat" cmpd="sng" algn="ctr">
+                      <a:solidFill>
+                        <a:srgbClr val="000000"/>
+                      </a:solidFill>
+                      <a:prstDash val="solid"/>
+                      <a:round/>
+                      <a:headEnd type="none" w="med" len="med"/>
+                      <a:tailEnd type="none" w="med" len="med"/>
+                    </a:lnB>
+                    <a:solidFill>
+                      <a:srgbClr val="FFFF00"/>
+                    </a:solidFill>
+                  </a:tcPr>
+                </a:tc>
+                <a:extLst>
+                  <a:ext uri="{0D108BD9-81ED-4DB2-BD59-A6C34878D82A}">
+                    <a16:rowId xmlns:a16="http://schemas.microsoft.com/office/drawing/2014/main" val="1087653809"/>
+                  </a:ext>
+                </a:extLst>
+              </a:tr>
+              <a:tr h="236220">
+                <a:tc>
+                  <a:txBody>
+                    <a:bodyPr/>
+                    <a:lstStyle/>
+                    <a:p>
+                      <a:pPr algn="l" fontAlgn="b"/>
+                      <a:r>
+                        <a:rPr lang="en-CA" sz="1100" b="1" i="0" u="none" strike="noStrike">
+                          <a:solidFill>
+                            <a:srgbClr val="000000"/>
+                          </a:solidFill>
+                          <a:effectLst/>
+                          <a:latin typeface="Aptos Narrow" panose="020B0004020202020204" pitchFamily="34" charset="0"/>
+                        </a:rPr>
+                        <a:t>Linear Regression</a:t>
+                      </a:r>
+                    </a:p>
+                  </a:txBody>
+                  <a:tcPr marL="7620" marR="7620" marT="7620" marB="0" anchor="b">
+                    <a:lnL w="6350" cap="flat" cmpd="sng" algn="ctr">
+                      <a:solidFill>
+                        <a:srgbClr val="000000"/>
+                      </a:solidFill>
+                      <a:prstDash val="solid"/>
+                      <a:round/>
+                      <a:headEnd type="none" w="med" len="med"/>
+                      <a:tailEnd type="none" w="med" len="med"/>
+                    </a:lnL>
+                    <a:lnR w="6350" cap="flat" cmpd="sng" algn="ctr">
+                      <a:solidFill>
+                        <a:srgbClr val="000000"/>
+                      </a:solidFill>
+                      <a:prstDash val="solid"/>
+                      <a:round/>
+                      <a:headEnd type="none" w="med" len="med"/>
+                      <a:tailEnd type="none" w="med" len="med"/>
+                    </a:lnR>
+                    <a:lnT w="6350" cap="flat" cmpd="sng" algn="ctr">
+                      <a:solidFill>
+                        <a:srgbClr val="000000"/>
+                      </a:solidFill>
+                      <a:prstDash val="solid"/>
+                      <a:round/>
+                      <a:headEnd type="none" w="med" len="med"/>
+                      <a:tailEnd type="none" w="med" len="med"/>
+                    </a:lnT>
+                    <a:lnB w="6350" cap="flat" cmpd="sng" algn="ctr">
+                      <a:solidFill>
+                        <a:srgbClr val="000000"/>
+                      </a:solidFill>
+                      <a:prstDash val="solid"/>
+                      <a:round/>
+                      <a:headEnd type="none" w="med" len="med"/>
+                      <a:tailEnd type="none" w="med" len="med"/>
+                    </a:lnB>
+                    <a:solidFill>
+                      <a:schemeClr val="bg1"/>
+                    </a:solidFill>
+                  </a:tcPr>
+                </a:tc>
+                <a:tc>
+                  <a:txBody>
+                    <a:bodyPr/>
+                    <a:lstStyle/>
+                    <a:p>
+                      <a:pPr algn="r" fontAlgn="b"/>
+                      <a:r>
+                        <a:rPr lang="en-CA" sz="1100" b="0" i="0" u="none" strike="noStrike">
+                          <a:solidFill>
+                            <a:srgbClr val="000000"/>
+                          </a:solidFill>
+                          <a:effectLst/>
+                          <a:latin typeface="Aptos Narrow" panose="020B0004020202020204" pitchFamily="34" charset="0"/>
+                        </a:rPr>
+                        <a:t>0.853</a:t>
+                      </a:r>
+                    </a:p>
+                  </a:txBody>
+                  <a:tcPr marL="7620" marR="7620" marT="7620" marB="0" anchor="b">
+                    <a:lnL w="6350" cap="flat" cmpd="sng" algn="ctr">
+                      <a:solidFill>
+                        <a:srgbClr val="000000"/>
+                      </a:solidFill>
+                      <a:prstDash val="solid"/>
+                      <a:round/>
+                      <a:headEnd type="none" w="med" len="med"/>
+                      <a:tailEnd type="none" w="med" len="med"/>
+                    </a:lnL>
+                    <a:lnR w="6350" cap="flat" cmpd="sng" algn="ctr">
+                      <a:solidFill>
+                        <a:srgbClr val="000000"/>
+                      </a:solidFill>
+                      <a:prstDash val="solid"/>
+                      <a:round/>
+                      <a:headEnd type="none" w="med" len="med"/>
+                      <a:tailEnd type="none" w="med" len="med"/>
+                    </a:lnR>
+                    <a:lnT w="6350" cap="flat" cmpd="sng" algn="ctr">
+                      <a:solidFill>
+                        <a:srgbClr val="000000"/>
+                      </a:solidFill>
+                      <a:prstDash val="solid"/>
+                      <a:round/>
+                      <a:headEnd type="none" w="med" len="med"/>
+                      <a:tailEnd type="none" w="med" len="med"/>
+                    </a:lnT>
+                    <a:lnB w="6350" cap="flat" cmpd="sng" algn="ctr">
+                      <a:solidFill>
+                        <a:srgbClr val="000000"/>
+                      </a:solidFill>
+                      <a:prstDash val="solid"/>
+                      <a:round/>
+                      <a:headEnd type="none" w="med" len="med"/>
+                      <a:tailEnd type="none" w="med" len="med"/>
+                    </a:lnB>
+                    <a:solidFill>
+                      <a:schemeClr val="bg1"/>
+                    </a:solidFill>
+                  </a:tcPr>
+                </a:tc>
+                <a:tc>
+                  <a:txBody>
+                    <a:bodyPr/>
+                    <a:lstStyle/>
+                    <a:p>
+                      <a:pPr algn="r" fontAlgn="b"/>
+                      <a:r>
+                        <a:rPr lang="en-CA" sz="1100" b="0" i="0" u="none" strike="noStrike" dirty="0">
+                          <a:solidFill>
+                            <a:srgbClr val="000000"/>
+                          </a:solidFill>
+                          <a:effectLst/>
+                          <a:highlight>
+                            <a:srgbClr val="FFFF00"/>
+                          </a:highlight>
+                          <a:latin typeface="Aptos Narrow" panose="020B0004020202020204" pitchFamily="34" charset="0"/>
+                        </a:rPr>
+                        <a:t>0.906</a:t>
+                      </a:r>
+                    </a:p>
+                  </a:txBody>
+                  <a:tcPr marL="7620" marR="7620" marT="7620" marB="0" anchor="b">
+                    <a:lnL w="6350" cap="flat" cmpd="sng" algn="ctr">
+                      <a:solidFill>
+                        <a:srgbClr val="000000"/>
+                      </a:solidFill>
+                      <a:prstDash val="solid"/>
+                      <a:round/>
+                      <a:headEnd type="none" w="med" len="med"/>
+                      <a:tailEnd type="none" w="med" len="med"/>
+                    </a:lnL>
+                    <a:lnR w="6350" cap="flat" cmpd="sng" algn="ctr">
+                      <a:solidFill>
+                        <a:srgbClr val="000000"/>
+                      </a:solidFill>
+                      <a:prstDash val="solid"/>
+                      <a:round/>
+                      <a:headEnd type="none" w="med" len="med"/>
+                      <a:tailEnd type="none" w="med" len="med"/>
+                    </a:lnR>
+                    <a:lnT w="6350" cap="flat" cmpd="sng" algn="ctr">
+                      <a:solidFill>
+                        <a:srgbClr val="000000"/>
+                      </a:solidFill>
+                      <a:prstDash val="solid"/>
+                      <a:round/>
+                      <a:headEnd type="none" w="med" len="med"/>
+                      <a:tailEnd type="none" w="med" len="med"/>
+                    </a:lnT>
+                    <a:lnB w="6350" cap="flat" cmpd="sng" algn="ctr">
+                      <a:solidFill>
+                        <a:srgbClr val="000000"/>
+                      </a:solidFill>
+                      <a:prstDash val="solid"/>
+                      <a:round/>
+                      <a:headEnd type="none" w="med" len="med"/>
+                      <a:tailEnd type="none" w="med" len="med"/>
+                    </a:lnB>
+                    <a:solidFill>
+                      <a:srgbClr val="FFFF00"/>
+                    </a:solidFill>
+                  </a:tcPr>
+                </a:tc>
+                <a:extLst>
+                  <a:ext uri="{0D108BD9-81ED-4DB2-BD59-A6C34878D82A}">
+                    <a16:rowId xmlns:a16="http://schemas.microsoft.com/office/drawing/2014/main" val="3967483585"/>
+                  </a:ext>
+                </a:extLst>
+              </a:tr>
+              <a:tr h="182880">
+                <a:tc>
+                  <a:txBody>
+                    <a:bodyPr/>
+                    <a:lstStyle/>
+                    <a:p>
+                      <a:pPr algn="l" fontAlgn="b"/>
+                      <a:r>
+                        <a:rPr lang="en-CA" sz="1100" b="1" i="0" u="none" strike="noStrike">
+                          <a:solidFill>
+                            <a:srgbClr val="000000"/>
+                          </a:solidFill>
+                          <a:effectLst/>
+                          <a:latin typeface="Aptos Narrow" panose="020B0004020202020204" pitchFamily="34" charset="0"/>
+                        </a:rPr>
+                        <a:t>Random Forest</a:t>
+                      </a:r>
+                    </a:p>
+                  </a:txBody>
+                  <a:tcPr marL="7620" marR="7620" marT="7620" marB="0" anchor="b">
+                    <a:lnL w="6350" cap="flat" cmpd="sng" algn="ctr">
+                      <a:solidFill>
+                        <a:srgbClr val="000000"/>
+                      </a:solidFill>
+                      <a:prstDash val="solid"/>
+                      <a:round/>
+                      <a:headEnd type="none" w="med" len="med"/>
+                      <a:tailEnd type="none" w="med" len="med"/>
+                    </a:lnL>
+                    <a:lnR w="6350" cap="flat" cmpd="sng" algn="ctr">
+                      <a:solidFill>
+                        <a:srgbClr val="000000"/>
+                      </a:solidFill>
+                      <a:prstDash val="solid"/>
+                      <a:round/>
+                      <a:headEnd type="none" w="med" len="med"/>
+                      <a:tailEnd type="none" w="med" len="med"/>
+                    </a:lnR>
+                    <a:lnT w="6350" cap="flat" cmpd="sng" algn="ctr">
+                      <a:solidFill>
+                        <a:srgbClr val="000000"/>
+                      </a:solidFill>
+                      <a:prstDash val="solid"/>
+                      <a:round/>
+                      <a:headEnd type="none" w="med" len="med"/>
+                      <a:tailEnd type="none" w="med" len="med"/>
+                    </a:lnT>
+                    <a:lnB w="6350" cap="flat" cmpd="sng" algn="ctr">
+                      <a:solidFill>
+                        <a:srgbClr val="000000"/>
+                      </a:solidFill>
+                      <a:prstDash val="solid"/>
+                      <a:round/>
+                      <a:headEnd type="none" w="med" len="med"/>
+                      <a:tailEnd type="none" w="med" len="med"/>
+                    </a:lnB>
+                    <a:solidFill>
+                      <a:schemeClr val="bg1"/>
+                    </a:solidFill>
+                  </a:tcPr>
+                </a:tc>
+                <a:tc>
+                  <a:txBody>
+                    <a:bodyPr/>
+                    <a:lstStyle/>
+                    <a:p>
+                      <a:pPr algn="r" fontAlgn="b"/>
+                      <a:r>
+                        <a:rPr lang="en-CA" sz="1100" b="0" i="0" u="none" strike="noStrike">
+                          <a:solidFill>
+                            <a:srgbClr val="000000"/>
+                          </a:solidFill>
+                          <a:effectLst/>
+                          <a:latin typeface="Aptos Narrow" panose="020B0004020202020204" pitchFamily="34" charset="0"/>
+                        </a:rPr>
+                        <a:t>0.926</a:t>
+                      </a:r>
+                    </a:p>
+                  </a:txBody>
+                  <a:tcPr marL="7620" marR="7620" marT="7620" marB="0" anchor="b">
+                    <a:lnL w="6350" cap="flat" cmpd="sng" algn="ctr">
+                      <a:solidFill>
+                        <a:srgbClr val="000000"/>
+                      </a:solidFill>
+                      <a:prstDash val="solid"/>
+                      <a:round/>
+                      <a:headEnd type="none" w="med" len="med"/>
+                      <a:tailEnd type="none" w="med" len="med"/>
+                    </a:lnL>
+                    <a:lnR w="6350" cap="flat" cmpd="sng" algn="ctr">
+                      <a:solidFill>
+                        <a:srgbClr val="000000"/>
+                      </a:solidFill>
+                      <a:prstDash val="solid"/>
+                      <a:round/>
+                      <a:headEnd type="none" w="med" len="med"/>
+                      <a:tailEnd type="none" w="med" len="med"/>
+                    </a:lnR>
+                    <a:lnT w="6350" cap="flat" cmpd="sng" algn="ctr">
+                      <a:solidFill>
+                        <a:srgbClr val="000000"/>
+                      </a:solidFill>
+                      <a:prstDash val="solid"/>
+                      <a:round/>
+                      <a:headEnd type="none" w="med" len="med"/>
+                      <a:tailEnd type="none" w="med" len="med"/>
+                    </a:lnT>
+                    <a:lnB w="6350" cap="flat" cmpd="sng" algn="ctr">
+                      <a:solidFill>
+                        <a:srgbClr val="000000"/>
+                      </a:solidFill>
+                      <a:prstDash val="solid"/>
+                      <a:round/>
+                      <a:headEnd type="none" w="med" len="med"/>
+                      <a:tailEnd type="none" w="med" len="med"/>
+                    </a:lnB>
+                    <a:solidFill>
+                      <a:schemeClr val="bg1"/>
+                    </a:solidFill>
+                  </a:tcPr>
+                </a:tc>
+                <a:tc>
+                  <a:txBody>
+                    <a:bodyPr/>
+                    <a:lstStyle/>
+                    <a:p>
+                      <a:pPr algn="r" fontAlgn="b"/>
+                      <a:r>
+                        <a:rPr lang="en-CA" sz="1100" b="0" i="0" u="none" strike="noStrike" dirty="0">
+                          <a:solidFill>
+                            <a:srgbClr val="000000"/>
+                          </a:solidFill>
+                          <a:effectLst/>
+                          <a:highlight>
+                            <a:srgbClr val="FFFF00"/>
+                          </a:highlight>
+                          <a:latin typeface="Aptos Narrow" panose="020B0004020202020204" pitchFamily="34" charset="0"/>
+                        </a:rPr>
+                        <a:t>0.966</a:t>
+                      </a:r>
+                    </a:p>
+                  </a:txBody>
+                  <a:tcPr marL="7620" marR="7620" marT="7620" marB="0" anchor="b">
+                    <a:lnL w="6350" cap="flat" cmpd="sng" algn="ctr">
+                      <a:solidFill>
+                        <a:srgbClr val="000000"/>
+                      </a:solidFill>
+                      <a:prstDash val="solid"/>
+                      <a:round/>
+                      <a:headEnd type="none" w="med" len="med"/>
+                      <a:tailEnd type="none" w="med" len="med"/>
+                    </a:lnL>
+                    <a:lnR w="6350" cap="flat" cmpd="sng" algn="ctr">
+                      <a:solidFill>
+                        <a:srgbClr val="000000"/>
+                      </a:solidFill>
+                      <a:prstDash val="solid"/>
+                      <a:round/>
+                      <a:headEnd type="none" w="med" len="med"/>
+                      <a:tailEnd type="none" w="med" len="med"/>
+                    </a:lnR>
+                    <a:lnT w="6350" cap="flat" cmpd="sng" algn="ctr">
+                      <a:solidFill>
+                        <a:srgbClr val="000000"/>
+                      </a:solidFill>
+                      <a:prstDash val="solid"/>
+                      <a:round/>
+                      <a:headEnd type="none" w="med" len="med"/>
+                      <a:tailEnd type="none" w="med" len="med"/>
+                    </a:lnT>
+                    <a:lnB w="6350" cap="flat" cmpd="sng" algn="ctr">
+                      <a:solidFill>
+                        <a:srgbClr val="000000"/>
+                      </a:solidFill>
+                      <a:prstDash val="solid"/>
+                      <a:round/>
+                      <a:headEnd type="none" w="med" len="med"/>
+                      <a:tailEnd type="none" w="med" len="med"/>
+                    </a:lnB>
+                    <a:solidFill>
+                      <a:srgbClr val="FFFF00"/>
+                    </a:solidFill>
+                  </a:tcPr>
+                </a:tc>
+                <a:extLst>
+                  <a:ext uri="{0D108BD9-81ED-4DB2-BD59-A6C34878D82A}">
+                    <a16:rowId xmlns:a16="http://schemas.microsoft.com/office/drawing/2014/main" val="3747103992"/>
+                  </a:ext>
+                </a:extLst>
+              </a:tr>
+              <a:tr h="182880">
+                <a:tc>
+                  <a:txBody>
+                    <a:bodyPr/>
+                    <a:lstStyle/>
+                    <a:p>
+                      <a:pPr algn="l" fontAlgn="b"/>
+                      <a:r>
+                        <a:rPr lang="en-CA" sz="1100" b="1" i="0" u="none" strike="noStrike">
+                          <a:solidFill>
+                            <a:srgbClr val="000000"/>
+                          </a:solidFill>
+                          <a:effectLst/>
+                          <a:latin typeface="Aptos Narrow" panose="020B0004020202020204" pitchFamily="34" charset="0"/>
+                        </a:rPr>
+                        <a:t>XG Boost</a:t>
+                      </a:r>
+                    </a:p>
+                  </a:txBody>
+                  <a:tcPr marL="7620" marR="7620" marT="7620" marB="0" anchor="b">
+                    <a:lnL w="6350" cap="flat" cmpd="sng" algn="ctr">
+                      <a:solidFill>
+                        <a:srgbClr val="000000"/>
+                      </a:solidFill>
+                      <a:prstDash val="solid"/>
+                      <a:round/>
+                      <a:headEnd type="none" w="med" len="med"/>
+                      <a:tailEnd type="none" w="med" len="med"/>
+                    </a:lnL>
+                    <a:lnR w="6350" cap="flat" cmpd="sng" algn="ctr">
+                      <a:solidFill>
+                        <a:srgbClr val="000000"/>
+                      </a:solidFill>
+                      <a:prstDash val="solid"/>
+                      <a:round/>
+                      <a:headEnd type="none" w="med" len="med"/>
+                      <a:tailEnd type="none" w="med" len="med"/>
+                    </a:lnR>
+                    <a:lnT w="6350" cap="flat" cmpd="sng" algn="ctr">
+                      <a:solidFill>
+                        <a:srgbClr val="000000"/>
+                      </a:solidFill>
+                      <a:prstDash val="solid"/>
+                      <a:round/>
+                      <a:headEnd type="none" w="med" len="med"/>
+                      <a:tailEnd type="none" w="med" len="med"/>
+                    </a:lnT>
+                    <a:lnB w="6350" cap="flat" cmpd="sng" algn="ctr">
+                      <a:solidFill>
+                        <a:srgbClr val="000000"/>
+                      </a:solidFill>
+                      <a:prstDash val="solid"/>
+                      <a:round/>
+                      <a:headEnd type="none" w="med" len="med"/>
+                      <a:tailEnd type="none" w="med" len="med"/>
+                    </a:lnB>
+                    <a:solidFill>
+                      <a:schemeClr val="bg1"/>
+                    </a:solidFill>
+                  </a:tcPr>
+                </a:tc>
+                <a:tc>
+                  <a:txBody>
+                    <a:bodyPr/>
+                    <a:lstStyle/>
+                    <a:p>
+                      <a:pPr algn="r" fontAlgn="b"/>
+                      <a:r>
+                        <a:rPr lang="en-CA" sz="1100" b="0" i="0" u="none" strike="noStrike">
+                          <a:solidFill>
+                            <a:srgbClr val="000000"/>
+                          </a:solidFill>
+                          <a:effectLst/>
+                          <a:latin typeface="Aptos Narrow" panose="020B0004020202020204" pitchFamily="34" charset="0"/>
+                        </a:rPr>
+                        <a:t>0.673</a:t>
+                      </a:r>
+                    </a:p>
+                  </a:txBody>
+                  <a:tcPr marL="7620" marR="7620" marT="7620" marB="0" anchor="b">
+                    <a:lnL w="6350" cap="flat" cmpd="sng" algn="ctr">
+                      <a:solidFill>
+                        <a:srgbClr val="000000"/>
+                      </a:solidFill>
+                      <a:prstDash val="solid"/>
+                      <a:round/>
+                      <a:headEnd type="none" w="med" len="med"/>
+                      <a:tailEnd type="none" w="med" len="med"/>
+                    </a:lnL>
+                    <a:lnR w="6350" cap="flat" cmpd="sng" algn="ctr">
+                      <a:solidFill>
+                        <a:srgbClr val="000000"/>
+                      </a:solidFill>
+                      <a:prstDash val="solid"/>
+                      <a:round/>
+                      <a:headEnd type="none" w="med" len="med"/>
+                      <a:tailEnd type="none" w="med" len="med"/>
+                    </a:lnR>
+                    <a:lnT w="6350" cap="flat" cmpd="sng" algn="ctr">
+                      <a:solidFill>
+                        <a:srgbClr val="000000"/>
+                      </a:solidFill>
+                      <a:prstDash val="solid"/>
+                      <a:round/>
+                      <a:headEnd type="none" w="med" len="med"/>
+                      <a:tailEnd type="none" w="med" len="med"/>
+                    </a:lnT>
+                    <a:lnB w="6350" cap="flat" cmpd="sng" algn="ctr">
+                      <a:solidFill>
+                        <a:srgbClr val="000000"/>
+                      </a:solidFill>
+                      <a:prstDash val="solid"/>
+                      <a:round/>
+                      <a:headEnd type="none" w="med" len="med"/>
+                      <a:tailEnd type="none" w="med" len="med"/>
+                    </a:lnB>
+                    <a:solidFill>
+                      <a:schemeClr val="bg1"/>
+                    </a:solidFill>
+                  </a:tcPr>
+                </a:tc>
+                <a:tc>
+                  <a:txBody>
+                    <a:bodyPr/>
+                    <a:lstStyle/>
+                    <a:p>
+                      <a:pPr algn="r" fontAlgn="b"/>
+                      <a:r>
+                        <a:rPr lang="en-CA" sz="1100" b="0" i="0" u="none" strike="noStrike" dirty="0">
+                          <a:solidFill>
+                            <a:srgbClr val="000000"/>
+                          </a:solidFill>
+                          <a:effectLst/>
+                          <a:highlight>
+                            <a:srgbClr val="FFFF00"/>
+                          </a:highlight>
+                          <a:latin typeface="Aptos Narrow" panose="020B0004020202020204" pitchFamily="34" charset="0"/>
+                        </a:rPr>
+                        <a:t>0.73</a:t>
+                      </a:r>
+                    </a:p>
+                  </a:txBody>
+                  <a:tcPr marL="7620" marR="7620" marT="7620" marB="0" anchor="b">
+                    <a:lnL w="6350" cap="flat" cmpd="sng" algn="ctr">
+                      <a:solidFill>
+                        <a:srgbClr val="000000"/>
+                      </a:solidFill>
+                      <a:prstDash val="solid"/>
+                      <a:round/>
+                      <a:headEnd type="none" w="med" len="med"/>
+                      <a:tailEnd type="none" w="med" len="med"/>
+                    </a:lnL>
+                    <a:lnR w="6350" cap="flat" cmpd="sng" algn="ctr">
+                      <a:solidFill>
+                        <a:srgbClr val="000000"/>
+                      </a:solidFill>
+                      <a:prstDash val="solid"/>
+                      <a:round/>
+                      <a:headEnd type="none" w="med" len="med"/>
+                      <a:tailEnd type="none" w="med" len="med"/>
+                    </a:lnR>
+                    <a:lnT w="6350" cap="flat" cmpd="sng" algn="ctr">
+                      <a:solidFill>
+                        <a:srgbClr val="000000"/>
+                      </a:solidFill>
+                      <a:prstDash val="solid"/>
+                      <a:round/>
+                      <a:headEnd type="none" w="med" len="med"/>
+                      <a:tailEnd type="none" w="med" len="med"/>
+                    </a:lnT>
+                    <a:lnB w="6350" cap="flat" cmpd="sng" algn="ctr">
+                      <a:solidFill>
+                        <a:srgbClr val="000000"/>
+                      </a:solidFill>
+                      <a:prstDash val="solid"/>
+                      <a:round/>
+                      <a:headEnd type="none" w="med" len="med"/>
+                      <a:tailEnd type="none" w="med" len="med"/>
+                    </a:lnB>
+                    <a:solidFill>
+                      <a:srgbClr val="FFFF00"/>
+                    </a:solidFill>
+                  </a:tcPr>
+                </a:tc>
+                <a:extLst>
+                  <a:ext uri="{0D108BD9-81ED-4DB2-BD59-A6C34878D82A}">
+                    <a16:rowId xmlns:a16="http://schemas.microsoft.com/office/drawing/2014/main" val="57409638"/>
+                  </a:ext>
+                </a:extLst>
+              </a:tr>
+            </a:tbl>
+          </a:graphicData>
+        </a:graphic>
+      </p:graphicFrame>
+      <p:sp>
+        <p:nvSpPr>
+          <p:cNvPr id="7" name="Content Placeholder 2">
+            <a:extLst>
+              <a:ext uri="{FF2B5EF4-FFF2-40B4-BE49-F238E27FC236}">
+                <a16:creationId xmlns:a16="http://schemas.microsoft.com/office/drawing/2014/main" id="{C8FEDF5A-24C0-AD38-8907-B6AA0971CB92}"/>
+              </a:ext>
+            </a:extLst>
+          </p:cNvPr>
+          <p:cNvSpPr>
+            <a:spLocks noGrp="1"/>
+          </p:cNvSpPr>
+          <p:nvPr>
+            <p:ph sz="half" idx="1"/>
+          </p:nvPr>
+        </p:nvSpPr>
+        <p:spPr>
+          <a:xfrm>
+            <a:off x="336006" y="1803400"/>
+            <a:ext cx="5181600" cy="4330313"/>
+          </a:xfrm>
+        </p:spPr>
+        <p:txBody>
+          <a:bodyPr>
+            <a:normAutofit/>
+          </a:bodyPr>
+          <a:lstStyle/>
+          <a:p>
+            <a:pPr marL="0" indent="0">
+              <a:buNone/>
+            </a:pPr>
+            <a:r>
+              <a:rPr lang="en-CA" dirty="0">
+                <a:solidFill>
+                  <a:schemeClr val="bg1"/>
+                </a:solidFill>
+              </a:rPr>
+              <a:t>Additional tuning steps were taken to hone in, but I didn’t capture them all in my notes</a:t>
+            </a:r>
+            <a:endParaRPr lang="en-CA" sz="2400" dirty="0">
+              <a:solidFill>
+                <a:schemeClr val="bg1"/>
+              </a:solidFill>
+            </a:endParaRPr>
+          </a:p>
+        </p:txBody>
+      </p:sp>
+    </p:spTree>
+    <p:extLst>
+      <p:ext uri="{BB962C8B-B14F-4D97-AF65-F5344CB8AC3E}">
+        <p14:creationId xmlns:p14="http://schemas.microsoft.com/office/powerpoint/2010/main" val="1706839221"/>
       </p:ext>
     </p:extLst>
   </p:cSld>

</xml_diff>